<commit_message>
PP fuer 05 CRM
</commit_message>
<xml_diff>
--- a/ConsultingAbschlusspräsentation.pptx
+++ b/ConsultingAbschlusspräsentation.pptx
@@ -5,7 +5,7 @@
     <p:sldMasterId id="2147483648" r:id="rId1"/>
   </p:sldMasterIdLst>
   <p:notesMasterIdLst>
-    <p:notesMasterId r:id="rId16"/>
+    <p:notesMasterId r:id="rId23"/>
   </p:notesMasterIdLst>
   <p:sldIdLst>
     <p:sldId id="256" r:id="rId2"/>
@@ -21,7 +21,14 @@
     <p:sldId id="271" r:id="rId12"/>
     <p:sldId id="272" r:id="rId13"/>
     <p:sldId id="270" r:id="rId14"/>
-    <p:sldId id="259" r:id="rId15"/>
+    <p:sldId id="276" r:id="rId15"/>
+    <p:sldId id="279" r:id="rId16"/>
+    <p:sldId id="275" r:id="rId17"/>
+    <p:sldId id="273" r:id="rId18"/>
+    <p:sldId id="274" r:id="rId19"/>
+    <p:sldId id="277" r:id="rId20"/>
+    <p:sldId id="278" r:id="rId21"/>
+    <p:sldId id="259" r:id="rId22"/>
   </p:sldIdLst>
   <p:sldSz cx="12192000" cy="6858000"/>
   <p:notesSz cx="6858000" cy="9144000"/>
@@ -156,6 +163,17 @@
             <p14:sldId id="270"/>
           </p14:sldIdLst>
         </p14:section>
+        <p14:section name="A05 - CRM" id="{CE4AEFE9-0C17-A549-B754-60C716A3D972}">
+          <p14:sldIdLst>
+            <p14:sldId id="276"/>
+            <p14:sldId id="279"/>
+            <p14:sldId id="275"/>
+            <p14:sldId id="273"/>
+            <p14:sldId id="274"/>
+            <p14:sldId id="277"/>
+            <p14:sldId id="278"/>
+          </p14:sldIdLst>
+        </p14:section>
         <p14:section name="Ende" id="{515565E5-9263-1E46-88A6-8B8232C6F1C0}">
           <p14:sldIdLst>
             <p14:sldId id="259"/>
@@ -173,7 +191,7 @@
 <file path=ppt/revisionInfo.xml><?xml version="1.0" encoding="utf-8"?>
 <p1510:revInfo xmlns:a="http://schemas.openxmlformats.org/drawingml/2006/main" xmlns:r="http://schemas.openxmlformats.org/officeDocument/2006/relationships" xmlns:p1510="http://schemas.microsoft.com/office/powerpoint/2015/10/main">
   <p1510:revLst>
-    <p1510:client id="{387BC905-FAFE-CF45-A6E1-9EDFA50EF862}" v="463" dt="2023-10-30T09:12:29.751"/>
+    <p1510:client id="{387BC905-FAFE-CF45-A6E1-9EDFA50EF862}" v="470" dt="2023-11-06T09:00:07.108"/>
   </p1510:revLst>
 </p1510:revInfo>
 </file>
@@ -476,7 +494,7 @@
   <pc:docChgLst>
     <pc:chgData name="Trenz, Niklas" userId="79f6a3b6-02fe-48be-ac46-05a2900cf117" providerId="ADAL" clId="{387BC905-FAFE-CF45-A6E1-9EDFA50EF862}"/>
     <pc:docChg chg="undo custSel mod addSld delSld modSld sldOrd modMainMaster addSection modSection">
-      <pc:chgData name="Trenz, Niklas" userId="79f6a3b6-02fe-48be-ac46-05a2900cf117" providerId="ADAL" clId="{387BC905-FAFE-CF45-A6E1-9EDFA50EF862}" dt="2023-10-30T09:30:45.355" v="1880" actId="2696"/>
+      <pc:chgData name="Trenz, Niklas" userId="79f6a3b6-02fe-48be-ac46-05a2900cf117" providerId="ADAL" clId="{387BC905-FAFE-CF45-A6E1-9EDFA50EF862}" dt="2023-11-06T09:27:48.326" v="2759" actId="20577"/>
       <pc:docMkLst>
         <pc:docMk/>
       </pc:docMkLst>
@@ -894,7 +912,7 @@
         </pc:spChg>
       </pc:sldChg>
       <pc:sldChg chg="modSp new mod modNotesTx">
-        <pc:chgData name="Trenz, Niklas" userId="79f6a3b6-02fe-48be-ac46-05a2900cf117" providerId="ADAL" clId="{387BC905-FAFE-CF45-A6E1-9EDFA50EF862}" dt="2023-10-30T09:00:59.685" v="1499" actId="20577"/>
+        <pc:chgData name="Trenz, Niklas" userId="79f6a3b6-02fe-48be-ac46-05a2900cf117" providerId="ADAL" clId="{387BC905-FAFE-CF45-A6E1-9EDFA50EF862}" dt="2023-10-30T09:42:04.771" v="2054" actId="255"/>
         <pc:sldMkLst>
           <pc:docMk/>
           <pc:sldMk cId="433209765" sldId="268"/>
@@ -1024,8 +1042,153 @@
           </ac:graphicFrameMkLst>
         </pc:graphicFrameChg>
       </pc:sldChg>
+      <pc:sldChg chg="modSp new mod ord">
+        <pc:chgData name="Trenz, Niklas" userId="79f6a3b6-02fe-48be-ac46-05a2900cf117" providerId="ADAL" clId="{387BC905-FAFE-CF45-A6E1-9EDFA50EF862}" dt="2023-11-06T09:09:36.678" v="2639" actId="115"/>
+        <pc:sldMkLst>
+          <pc:docMk/>
+          <pc:sldMk cId="1977673408" sldId="273"/>
+        </pc:sldMkLst>
+        <pc:spChg chg="mod">
+          <ac:chgData name="Trenz, Niklas" userId="79f6a3b6-02fe-48be-ac46-05a2900cf117" providerId="ADAL" clId="{387BC905-FAFE-CF45-A6E1-9EDFA50EF862}" dt="2023-11-06T09:04:22.034" v="2384" actId="20577"/>
+          <ac:spMkLst>
+            <pc:docMk/>
+            <pc:sldMk cId="1977673408" sldId="273"/>
+            <ac:spMk id="2" creationId="{C7957E3D-D7C3-C8A2-55C0-0BD7430F52F1}"/>
+          </ac:spMkLst>
+        </pc:spChg>
+        <pc:spChg chg="mod">
+          <ac:chgData name="Trenz, Niklas" userId="79f6a3b6-02fe-48be-ac46-05a2900cf117" providerId="ADAL" clId="{387BC905-FAFE-CF45-A6E1-9EDFA50EF862}" dt="2023-11-06T09:09:36.678" v="2639" actId="115"/>
+          <ac:spMkLst>
+            <pc:docMk/>
+            <pc:sldMk cId="1977673408" sldId="273"/>
+            <ac:spMk id="3" creationId="{15083A2A-18AC-8768-50E4-3A4FDFCD0BB0}"/>
+          </ac:spMkLst>
+        </pc:spChg>
+      </pc:sldChg>
+      <pc:sldChg chg="modSp new mod modNotesTx">
+        <pc:chgData name="Trenz, Niklas" userId="79f6a3b6-02fe-48be-ac46-05a2900cf117" providerId="ADAL" clId="{387BC905-FAFE-CF45-A6E1-9EDFA50EF862}" dt="2023-11-06T09:25:10.071" v="2709" actId="20577"/>
+        <pc:sldMkLst>
+          <pc:docMk/>
+          <pc:sldMk cId="1741602038" sldId="274"/>
+        </pc:sldMkLst>
+        <pc:spChg chg="mod">
+          <ac:chgData name="Trenz, Niklas" userId="79f6a3b6-02fe-48be-ac46-05a2900cf117" providerId="ADAL" clId="{387BC905-FAFE-CF45-A6E1-9EDFA50EF862}" dt="2023-11-06T08:43:59.192" v="2088" actId="20577"/>
+          <ac:spMkLst>
+            <pc:docMk/>
+            <pc:sldMk cId="1741602038" sldId="274"/>
+            <ac:spMk id="2" creationId="{94EFAEC8-66BC-809C-4186-8F18EFA15EC8}"/>
+          </ac:spMkLst>
+        </pc:spChg>
+        <pc:spChg chg="mod">
+          <ac:chgData name="Trenz, Niklas" userId="79f6a3b6-02fe-48be-ac46-05a2900cf117" providerId="ADAL" clId="{387BC905-FAFE-CF45-A6E1-9EDFA50EF862}" dt="2023-11-06T09:25:10.071" v="2709" actId="20577"/>
+          <ac:spMkLst>
+            <pc:docMk/>
+            <pc:sldMk cId="1741602038" sldId="274"/>
+            <ac:spMk id="3" creationId="{3ED717B3-3FAA-BFFC-C8A3-1D5347569237}"/>
+          </ac:spMkLst>
+        </pc:spChg>
+      </pc:sldChg>
+      <pc:sldChg chg="modSp add mod">
+        <pc:chgData name="Trenz, Niklas" userId="79f6a3b6-02fe-48be-ac46-05a2900cf117" providerId="ADAL" clId="{387BC905-FAFE-CF45-A6E1-9EDFA50EF862}" dt="2023-11-06T09:09:27.745" v="2635" actId="115"/>
+        <pc:sldMkLst>
+          <pc:docMk/>
+          <pc:sldMk cId="1283157994" sldId="275"/>
+        </pc:sldMkLst>
+        <pc:spChg chg="mod">
+          <ac:chgData name="Trenz, Niklas" userId="79f6a3b6-02fe-48be-ac46-05a2900cf117" providerId="ADAL" clId="{387BC905-FAFE-CF45-A6E1-9EDFA50EF862}" dt="2023-11-06T09:04:18.661" v="2381" actId="20577"/>
+          <ac:spMkLst>
+            <pc:docMk/>
+            <pc:sldMk cId="1283157994" sldId="275"/>
+            <ac:spMk id="2" creationId="{C7957E3D-D7C3-C8A2-55C0-0BD7430F52F1}"/>
+          </ac:spMkLst>
+        </pc:spChg>
+        <pc:spChg chg="mod">
+          <ac:chgData name="Trenz, Niklas" userId="79f6a3b6-02fe-48be-ac46-05a2900cf117" providerId="ADAL" clId="{387BC905-FAFE-CF45-A6E1-9EDFA50EF862}" dt="2023-11-06T09:09:27.745" v="2635" actId="115"/>
+          <ac:spMkLst>
+            <pc:docMk/>
+            <pc:sldMk cId="1283157994" sldId="275"/>
+            <ac:spMk id="3" creationId="{15083A2A-18AC-8768-50E4-3A4FDFCD0BB0}"/>
+          </ac:spMkLst>
+        </pc:spChg>
+      </pc:sldChg>
+      <pc:sldChg chg="modSp add mod ord">
+        <pc:chgData name="Trenz, Niklas" userId="79f6a3b6-02fe-48be-ac46-05a2900cf117" providerId="ADAL" clId="{387BC905-FAFE-CF45-A6E1-9EDFA50EF862}" dt="2023-11-06T09:08:55.104" v="2626" actId="115"/>
+        <pc:sldMkLst>
+          <pc:docMk/>
+          <pc:sldMk cId="556458354" sldId="276"/>
+        </pc:sldMkLst>
+        <pc:spChg chg="mod">
+          <ac:chgData name="Trenz, Niklas" userId="79f6a3b6-02fe-48be-ac46-05a2900cf117" providerId="ADAL" clId="{387BC905-FAFE-CF45-A6E1-9EDFA50EF862}" dt="2023-11-06T09:04:13.351" v="2375" actId="20577"/>
+          <ac:spMkLst>
+            <pc:docMk/>
+            <pc:sldMk cId="556458354" sldId="276"/>
+            <ac:spMk id="2" creationId="{C7957E3D-D7C3-C8A2-55C0-0BD7430F52F1}"/>
+          </ac:spMkLst>
+        </pc:spChg>
+        <pc:spChg chg="mod">
+          <ac:chgData name="Trenz, Niklas" userId="79f6a3b6-02fe-48be-ac46-05a2900cf117" providerId="ADAL" clId="{387BC905-FAFE-CF45-A6E1-9EDFA50EF862}" dt="2023-11-06T09:08:55.104" v="2626" actId="115"/>
+          <ac:spMkLst>
+            <pc:docMk/>
+            <pc:sldMk cId="556458354" sldId="276"/>
+            <ac:spMk id="3" creationId="{15083A2A-18AC-8768-50E4-3A4FDFCD0BB0}"/>
+          </ac:spMkLst>
+        </pc:spChg>
+      </pc:sldChg>
+      <pc:sldChg chg="modSp add mod modNotesTx">
+        <pc:chgData name="Trenz, Niklas" userId="79f6a3b6-02fe-48be-ac46-05a2900cf117" providerId="ADAL" clId="{387BC905-FAFE-CF45-A6E1-9EDFA50EF862}" dt="2023-11-06T09:27:48.326" v="2759" actId="20577"/>
+        <pc:sldMkLst>
+          <pc:docMk/>
+          <pc:sldMk cId="575291190" sldId="277"/>
+        </pc:sldMkLst>
+        <pc:spChg chg="mod">
+          <ac:chgData name="Trenz, Niklas" userId="79f6a3b6-02fe-48be-ac46-05a2900cf117" providerId="ADAL" clId="{387BC905-FAFE-CF45-A6E1-9EDFA50EF862}" dt="2023-11-06T09:25:29.576" v="2715" actId="20577"/>
+          <ac:spMkLst>
+            <pc:docMk/>
+            <pc:sldMk cId="575291190" sldId="277"/>
+            <ac:spMk id="3" creationId="{3ED717B3-3FAA-BFFC-C8A3-1D5347569237}"/>
+          </ac:spMkLst>
+        </pc:spChg>
+      </pc:sldChg>
+      <pc:sldChg chg="modSp add mod">
+        <pc:chgData name="Trenz, Niklas" userId="79f6a3b6-02fe-48be-ac46-05a2900cf117" providerId="ADAL" clId="{387BC905-FAFE-CF45-A6E1-9EDFA50EF862}" dt="2023-11-06T09:07:05.770" v="2619" actId="207"/>
+        <pc:sldMkLst>
+          <pc:docMk/>
+          <pc:sldMk cId="675485425" sldId="278"/>
+        </pc:sldMkLst>
+        <pc:spChg chg="mod">
+          <ac:chgData name="Trenz, Niklas" userId="79f6a3b6-02fe-48be-ac46-05a2900cf117" providerId="ADAL" clId="{387BC905-FAFE-CF45-A6E1-9EDFA50EF862}" dt="2023-11-06T09:07:05.770" v="2619" actId="207"/>
+          <ac:spMkLst>
+            <pc:docMk/>
+            <pc:sldMk cId="675485425" sldId="278"/>
+            <ac:spMk id="3" creationId="{3ED717B3-3FAA-BFFC-C8A3-1D5347569237}"/>
+          </ac:spMkLst>
+        </pc:spChg>
+      </pc:sldChg>
+      <pc:sldChg chg="modSp add mod">
+        <pc:chgData name="Trenz, Niklas" userId="79f6a3b6-02fe-48be-ac46-05a2900cf117" providerId="ADAL" clId="{387BC905-FAFE-CF45-A6E1-9EDFA50EF862}" dt="2023-11-06T09:09:10.440" v="2631" actId="115"/>
+        <pc:sldMkLst>
+          <pc:docMk/>
+          <pc:sldMk cId="2166135483" sldId="279"/>
+        </pc:sldMkLst>
+        <pc:spChg chg="mod">
+          <ac:chgData name="Trenz, Niklas" userId="79f6a3b6-02fe-48be-ac46-05a2900cf117" providerId="ADAL" clId="{387BC905-FAFE-CF45-A6E1-9EDFA50EF862}" dt="2023-11-06T09:04:16.029" v="2378" actId="20577"/>
+          <ac:spMkLst>
+            <pc:docMk/>
+            <pc:sldMk cId="2166135483" sldId="279"/>
+            <ac:spMk id="2" creationId="{C7957E3D-D7C3-C8A2-55C0-0BD7430F52F1}"/>
+          </ac:spMkLst>
+        </pc:spChg>
+        <pc:spChg chg="mod">
+          <ac:chgData name="Trenz, Niklas" userId="79f6a3b6-02fe-48be-ac46-05a2900cf117" providerId="ADAL" clId="{387BC905-FAFE-CF45-A6E1-9EDFA50EF862}" dt="2023-11-06T09:09:10.440" v="2631" actId="115"/>
+          <ac:spMkLst>
+            <pc:docMk/>
+            <pc:sldMk cId="2166135483" sldId="279"/>
+            <ac:spMk id="3" creationId="{15083A2A-18AC-8768-50E4-3A4FDFCD0BB0}"/>
+          </ac:spMkLst>
+        </pc:spChg>
+      </pc:sldChg>
       <pc:sldMasterChg chg="addSp delSp modSp mod modAnim addSldLayout modSldLayout">
-        <pc:chgData name="Trenz, Niklas" userId="79f6a3b6-02fe-48be-ac46-05a2900cf117" providerId="ADAL" clId="{387BC905-FAFE-CF45-A6E1-9EDFA50EF862}" dt="2023-10-23T07:21:26.421" v="456" actId="14100"/>
+        <pc:chgData name="Trenz, Niklas" userId="79f6a3b6-02fe-48be-ac46-05a2900cf117" providerId="ADAL" clId="{387BC905-FAFE-CF45-A6E1-9EDFA50EF862}" dt="2023-11-06T08:54:53.168" v="2185" actId="2711"/>
         <pc:sldMasterMkLst>
           <pc:docMk/>
           <pc:sldMasterMk cId="1418058678" sldId="2147483648"/>
@@ -1039,7 +1202,7 @@
           </ac:spMkLst>
         </pc:spChg>
         <pc:spChg chg="mod">
-          <ac:chgData name="Trenz, Niklas" userId="79f6a3b6-02fe-48be-ac46-05a2900cf117" providerId="ADAL" clId="{387BC905-FAFE-CF45-A6E1-9EDFA50EF862}" dt="2023-10-17T08:28:28.086" v="91" actId="2711"/>
+          <ac:chgData name="Trenz, Niklas" userId="79f6a3b6-02fe-48be-ac46-05a2900cf117" providerId="ADAL" clId="{387BC905-FAFE-CF45-A6E1-9EDFA50EF862}" dt="2023-11-06T08:54:53.168" v="2185" actId="2711"/>
           <ac:spMkLst>
             <pc:docMk/>
             <pc:sldMasterMk cId="1418058678" sldId="2147483648"/>
@@ -1771,7 +1934,7 @@
           <a:p>
             <a:fld id="{AF2FF00B-49C5-FF4E-B3FD-D8224D3BE089}" type="datetimeFigureOut">
               <a:rPr lang="de-DE" smtClean="0"/>
-              <a:t>30.10.23</a:t>
+              <a:t>06.11.23</a:t>
             </a:fld>
             <a:endParaRPr lang="de-DE"/>
           </a:p>
@@ -2746,8 +2909,65 @@
                 <a:ea typeface="Calibri" panose="020F0502020204030204" pitchFamily="34" charset="0"/>
                 <a:cs typeface="Times New Roman" panose="02020603050405020304" pitchFamily="18" charset="0"/>
               </a:rPr>
-              <a:t>Entwicklung einer klaren Verkaufsstrategie und Festlegung von Zielen für das Gespräch.</a:t>
-            </a:r>
+              <a:t>Entwicklung einer klaren Verkaufsstrategie und Festlegung von Zielen für das Gespräch</a:t>
+            </a:r>
+          </a:p>
+          <a:p>
+            <a:pPr marL="342900" lvl="0" indent="-342900">
+              <a:lnSpc>
+                <a:spcPct val="107000"/>
+              </a:lnSpc>
+              <a:spcAft>
+                <a:spcPts val="800"/>
+              </a:spcAft>
+              <a:buFont typeface="Symbol" pitchFamily="2" charset="2"/>
+              <a:buChar char=""/>
+            </a:pPr>
+            <a:endParaRPr lang="de-DE" sz="1800" kern="100" dirty="0">
+              <a:effectLst/>
+              <a:latin typeface="Calibri" panose="020F0502020204030204" pitchFamily="34" charset="0"/>
+              <a:ea typeface="Calibri" panose="020F0502020204030204" pitchFamily="34" charset="0"/>
+              <a:cs typeface="Times New Roman" panose="02020603050405020304" pitchFamily="18" charset="0"/>
+            </a:endParaRPr>
+          </a:p>
+          <a:p>
+            <a:pPr marL="0" lvl="0" indent="0">
+              <a:lnSpc>
+                <a:spcPct val="107000"/>
+              </a:lnSpc>
+              <a:spcAft>
+                <a:spcPts val="800"/>
+              </a:spcAft>
+              <a:buFont typeface="Symbol" pitchFamily="2" charset="2"/>
+              <a:buNone/>
+            </a:pPr>
+            <a:r>
+              <a:rPr lang="de-DE" sz="1800" kern="100" dirty="0">
+                <a:effectLst/>
+                <a:latin typeface="Calibri" panose="020F0502020204030204" pitchFamily="34" charset="0"/>
+                <a:ea typeface="Calibri" panose="020F0502020204030204" pitchFamily="34" charset="0"/>
+                <a:cs typeface="Times New Roman" panose="02020603050405020304" pitchFamily="18" charset="0"/>
+              </a:rPr>
+              <a:t>Hier noch wichtig: wie kommen wir im Vorfeld an die relevanten Informationen?</a:t>
+            </a:r>
+          </a:p>
+          <a:p>
+            <a:pPr marL="0" lvl="0" indent="0">
+              <a:lnSpc>
+                <a:spcPct val="107000"/>
+              </a:lnSpc>
+              <a:spcAft>
+                <a:spcPts val="800"/>
+              </a:spcAft>
+              <a:buFont typeface="Symbol" pitchFamily="2" charset="2"/>
+              <a:buNone/>
+            </a:pPr>
+            <a:endParaRPr lang="de-DE" sz="4400" kern="100" dirty="0">
+              <a:effectLst/>
+              <a:latin typeface="Calibri" panose="020F0502020204030204" pitchFamily="34" charset="0"/>
+              <a:ea typeface="Calibri" panose="020F0502020204030204" pitchFamily="34" charset="0"/>
+              <a:cs typeface="Times New Roman" panose="02020603050405020304" pitchFamily="18" charset="0"/>
+            </a:endParaRPr>
           </a:p>
         </p:txBody>
       </p:sp>
@@ -3774,6 +3994,370 @@
     <p:extLst>
       <p:ext uri="{BB962C8B-B14F-4D97-AF65-F5344CB8AC3E}">
         <p14:creationId xmlns:p14="http://schemas.microsoft.com/office/powerpoint/2010/main" val="1536424016"/>
+      </p:ext>
+    </p:extLst>
+  </p:cSld>
+  <p:clrMapOvr>
+    <a:masterClrMapping/>
+  </p:clrMapOvr>
+</p:notes>
+</file>
+
+<file path=ppt/notesSlides/notesSlide7.xml><?xml version="1.0" encoding="utf-8"?>
+<p:notes xmlns:a="http://schemas.openxmlformats.org/drawingml/2006/main" xmlns:r="http://schemas.openxmlformats.org/officeDocument/2006/relationships" xmlns:p="http://schemas.openxmlformats.org/presentationml/2006/main">
+  <p:cSld>
+    <p:spTree>
+      <p:nvGrpSpPr>
+        <p:cNvPr id="1" name=""/>
+        <p:cNvGrpSpPr/>
+        <p:nvPr/>
+      </p:nvGrpSpPr>
+      <p:grpSpPr>
+        <a:xfrm>
+          <a:off x="0" y="0"/>
+          <a:ext cx="0" cy="0"/>
+          <a:chOff x="0" y="0"/>
+          <a:chExt cx="0" cy="0"/>
+        </a:xfrm>
+      </p:grpSpPr>
+      <p:sp>
+        <p:nvSpPr>
+          <p:cNvPr id="2" name="Folienbildplatzhalter 1"/>
+          <p:cNvSpPr>
+            <a:spLocks noGrp="1" noRot="1" noChangeAspect="1"/>
+          </p:cNvSpPr>
+          <p:nvPr>
+            <p:ph type="sldImg"/>
+          </p:nvPr>
+        </p:nvSpPr>
+        <p:spPr/>
+      </p:sp>
+      <p:sp>
+        <p:nvSpPr>
+          <p:cNvPr id="3" name="Notizenplatzhalter 2"/>
+          <p:cNvSpPr>
+            <a:spLocks noGrp="1"/>
+          </p:cNvSpPr>
+          <p:nvPr>
+            <p:ph type="body" idx="1"/>
+          </p:nvPr>
+        </p:nvSpPr>
+        <p:spPr/>
+        <p:txBody>
+          <a:bodyPr/>
+          <a:lstStyle/>
+          <a:p>
+            <a:pPr marL="0" indent="0">
+              <a:buNone/>
+            </a:pPr>
+            <a:r>
+              <a:rPr lang="de-DE" sz="1400" b="1" dirty="0"/>
+              <a:t>Wichtige Kundendaten:</a:t>
+            </a:r>
+          </a:p>
+          <a:p>
+            <a:pPr marL="171450" indent="-171450">
+              <a:buFont typeface="Arial" panose="020B0604020202020204" pitchFamily="34" charset="0"/>
+              <a:buChar char="•"/>
+            </a:pPr>
+            <a:r>
+              <a:rPr lang="de-DE" sz="1200" u="sng" dirty="0"/>
+              <a:t>Kontaktdaten</a:t>
+            </a:r>
+            <a:r>
+              <a:rPr lang="de-DE" sz="1200" dirty="0"/>
+              <a:t>: Name, Adresse, Telefonnummer, E-Mail</a:t>
+            </a:r>
+          </a:p>
+          <a:p>
+            <a:pPr marL="171450" indent="-171450">
+              <a:buFont typeface="Arial" panose="020B0604020202020204" pitchFamily="34" charset="0"/>
+              <a:buChar char="•"/>
+            </a:pPr>
+            <a:r>
+              <a:rPr lang="de-DE" sz="1200" u="sng" dirty="0"/>
+              <a:t>Kaufhistorie</a:t>
+            </a:r>
+            <a:r>
+              <a:rPr lang="de-DE" sz="1200" dirty="0"/>
+              <a:t>: Bisherige Einkäufe und Verträge</a:t>
+            </a:r>
+          </a:p>
+          <a:p>
+            <a:pPr marL="171450" indent="-171450">
+              <a:buFont typeface="Arial" panose="020B0604020202020204" pitchFamily="34" charset="0"/>
+              <a:buChar char="•"/>
+            </a:pPr>
+            <a:r>
+              <a:rPr lang="de-DE" sz="1200" u="sng" dirty="0"/>
+              <a:t>Bedarfsanalyse</a:t>
+            </a:r>
+            <a:r>
+              <a:rPr lang="de-DE" sz="1200" dirty="0"/>
+              <a:t>: Informationen zu den Bedürfnissen und Herausforderungen des Kunden</a:t>
+            </a:r>
+          </a:p>
+          <a:p>
+            <a:pPr marL="171450" indent="-171450">
+              <a:buFont typeface="Arial" panose="020B0604020202020204" pitchFamily="34" charset="0"/>
+              <a:buChar char="•"/>
+            </a:pPr>
+            <a:r>
+              <a:rPr lang="de-DE" sz="1200" u="sng" dirty="0"/>
+              <a:t>Kommunikationsverlauf</a:t>
+            </a:r>
+            <a:r>
+              <a:rPr lang="de-DE" sz="1200" dirty="0"/>
+              <a:t>: Protokolle von Gesprächen und E-Mails</a:t>
+            </a:r>
+          </a:p>
+          <a:p>
+            <a:pPr marL="0" indent="0">
+              <a:buNone/>
+            </a:pPr>
+            <a:r>
+              <a:rPr lang="de-DE" sz="1400" b="1" dirty="0"/>
+              <a:t>Kommunikationskanäle:</a:t>
+            </a:r>
+          </a:p>
+          <a:p>
+            <a:pPr marL="457200" indent="-457200">
+              <a:buFont typeface="+mj-lt"/>
+              <a:buAutoNum type="arabicPeriod"/>
+            </a:pPr>
+            <a:r>
+              <a:rPr lang="de-DE" sz="1400" dirty="0"/>
+              <a:t>☎️ Telefon</a:t>
+            </a:r>
+          </a:p>
+          <a:p>
+            <a:pPr marL="457200" indent="-457200">
+              <a:buFont typeface="+mj-lt"/>
+              <a:buAutoNum type="arabicPeriod"/>
+            </a:pPr>
+            <a:r>
+              <a:rPr lang="de-DE" sz="1400" dirty="0"/>
+              <a:t>📧 E-Mail</a:t>
+            </a:r>
+          </a:p>
+          <a:p>
+            <a:pPr marL="457200" indent="-457200">
+              <a:buFont typeface="+mj-lt"/>
+              <a:buAutoNum type="arabicPeriod"/>
+            </a:pPr>
+            <a:r>
+              <a:rPr lang="de-DE" sz="1400" dirty="0"/>
+              <a:t>🛜 Internet (</a:t>
+            </a:r>
+            <a:r>
+              <a:rPr lang="de-DE" sz="1400" dirty="0" err="1"/>
+              <a:t>Social</a:t>
+            </a:r>
+            <a:r>
+              <a:rPr lang="de-DE" sz="1400" dirty="0"/>
+              <a:t> Media, Webseite)</a:t>
+            </a:r>
+          </a:p>
+          <a:p>
+            <a:endParaRPr lang="de-DE" dirty="0"/>
+          </a:p>
+        </p:txBody>
+      </p:sp>
+      <p:sp>
+        <p:nvSpPr>
+          <p:cNvPr id="4" name="Foliennummernplatzhalter 3"/>
+          <p:cNvSpPr>
+            <a:spLocks noGrp="1"/>
+          </p:cNvSpPr>
+          <p:nvPr>
+            <p:ph type="sldNum" sz="quarter" idx="5"/>
+          </p:nvPr>
+        </p:nvSpPr>
+        <p:spPr/>
+        <p:txBody>
+          <a:bodyPr/>
+          <a:lstStyle/>
+          <a:p>
+            <a:fld id="{C20589B6-2077-F44F-8FD6-3E6CA72E71C7}" type="slidenum">
+              <a:rPr lang="de-DE" smtClean="0"/>
+              <a:t>18</a:t>
+            </a:fld>
+            <a:endParaRPr lang="de-DE"/>
+          </a:p>
+        </p:txBody>
+      </p:sp>
+    </p:spTree>
+    <p:extLst>
+      <p:ext uri="{BB962C8B-B14F-4D97-AF65-F5344CB8AC3E}">
+        <p14:creationId xmlns:p14="http://schemas.microsoft.com/office/powerpoint/2010/main" val="1369423243"/>
+      </p:ext>
+    </p:extLst>
+  </p:cSld>
+  <p:clrMapOvr>
+    <a:masterClrMapping/>
+  </p:clrMapOvr>
+</p:notes>
+</file>
+
+<file path=ppt/notesSlides/notesSlide8.xml><?xml version="1.0" encoding="utf-8"?>
+<p:notes xmlns:a="http://schemas.openxmlformats.org/drawingml/2006/main" xmlns:r="http://schemas.openxmlformats.org/officeDocument/2006/relationships" xmlns:p="http://schemas.openxmlformats.org/presentationml/2006/main">
+  <p:cSld>
+    <p:spTree>
+      <p:nvGrpSpPr>
+        <p:cNvPr id="1" name=""/>
+        <p:cNvGrpSpPr/>
+        <p:nvPr/>
+      </p:nvGrpSpPr>
+      <p:grpSpPr>
+        <a:xfrm>
+          <a:off x="0" y="0"/>
+          <a:ext cx="0" cy="0"/>
+          <a:chOff x="0" y="0"/>
+          <a:chExt cx="0" cy="0"/>
+        </a:xfrm>
+      </p:grpSpPr>
+      <p:sp>
+        <p:nvSpPr>
+          <p:cNvPr id="2" name="Folienbildplatzhalter 1"/>
+          <p:cNvSpPr>
+            <a:spLocks noGrp="1" noRot="1" noChangeAspect="1"/>
+          </p:cNvSpPr>
+          <p:nvPr>
+            <p:ph type="sldImg"/>
+          </p:nvPr>
+        </p:nvSpPr>
+        <p:spPr/>
+      </p:sp>
+      <p:sp>
+        <p:nvSpPr>
+          <p:cNvPr id="3" name="Notizenplatzhalter 2"/>
+          <p:cNvSpPr>
+            <a:spLocks noGrp="1"/>
+          </p:cNvSpPr>
+          <p:nvPr>
+            <p:ph type="body" idx="1"/>
+          </p:nvPr>
+        </p:nvSpPr>
+        <p:spPr/>
+        <p:txBody>
+          <a:bodyPr/>
+          <a:lstStyle/>
+          <a:p>
+            <a:pPr marL="0" indent="0">
+              <a:buNone/>
+            </a:pPr>
+            <a:r>
+              <a:rPr lang="de-DE" sz="1400" b="1" dirty="0"/>
+              <a:t>Kundenklassifizierung:</a:t>
+            </a:r>
+          </a:p>
+          <a:p>
+            <a:pPr marL="171450" indent="-171450">
+              <a:buFont typeface="Arial" panose="020B0604020202020204" pitchFamily="34" charset="0"/>
+              <a:buChar char="•"/>
+            </a:pPr>
+            <a:r>
+              <a:rPr lang="de-DE" sz="1200" u="sng" dirty="0"/>
+              <a:t>A-Kunden</a:t>
+            </a:r>
+            <a:r>
+              <a:rPr lang="de-DE" sz="1200" dirty="0"/>
+              <a:t>: Großkunden und Schlüsselkunden mit hohem Umsatzpotenzial</a:t>
+            </a:r>
+          </a:p>
+          <a:p>
+            <a:pPr marL="171450" indent="-171450">
+              <a:buFont typeface="Arial" panose="020B0604020202020204" pitchFamily="34" charset="0"/>
+              <a:buChar char="•"/>
+            </a:pPr>
+            <a:r>
+              <a:rPr lang="de-DE" sz="1200" u="sng" dirty="0"/>
+              <a:t>B-Kunden</a:t>
+            </a:r>
+            <a:r>
+              <a:rPr lang="de-DE" sz="1200" dirty="0"/>
+              <a:t>: Kunden mit mittlerem Umsatzpotenzial</a:t>
+            </a:r>
+          </a:p>
+          <a:p>
+            <a:pPr marL="171450" indent="-171450">
+              <a:buFont typeface="Arial" panose="020B0604020202020204" pitchFamily="34" charset="0"/>
+              <a:buChar char="•"/>
+            </a:pPr>
+            <a:r>
+              <a:rPr lang="de-DE" sz="1200" u="sng" dirty="0">
+                <a:solidFill>
+                  <a:schemeClr val="tx1">
+                    <a:lumMod val="50000"/>
+                    <a:lumOff val="50000"/>
+                  </a:schemeClr>
+                </a:solidFill>
+              </a:rPr>
+              <a:t>C-Kunden</a:t>
+            </a:r>
+            <a:r>
+              <a:rPr lang="de-DE" sz="1200" dirty="0">
+                <a:solidFill>
+                  <a:schemeClr val="tx1">
+                    <a:lumMod val="50000"/>
+                    <a:lumOff val="50000"/>
+                  </a:schemeClr>
+                </a:solidFill>
+              </a:rPr>
+              <a:t>: Kleinkunden im Privatkundensegment (sind irrelevant weil </a:t>
+            </a:r>
+            <a:r>
+              <a:rPr lang="de-DE" sz="1200">
+                <a:solidFill>
+                  <a:schemeClr val="tx1">
+                    <a:lumMod val="50000"/>
+                    <a:lumOff val="50000"/>
+                  </a:schemeClr>
+                </a:solidFill>
+              </a:rPr>
+              <a:t>zu klein)</a:t>
+            </a:r>
+            <a:endParaRPr lang="de-DE" sz="1200" dirty="0">
+              <a:solidFill>
+                <a:schemeClr val="tx1">
+                  <a:lumMod val="50000"/>
+                  <a:lumOff val="50000"/>
+                </a:schemeClr>
+              </a:solidFill>
+            </a:endParaRPr>
+          </a:p>
+          <a:p>
+            <a:endParaRPr lang="de-DE" dirty="0"/>
+          </a:p>
+        </p:txBody>
+      </p:sp>
+      <p:sp>
+        <p:nvSpPr>
+          <p:cNvPr id="4" name="Foliennummernplatzhalter 3"/>
+          <p:cNvSpPr>
+            <a:spLocks noGrp="1"/>
+          </p:cNvSpPr>
+          <p:nvPr>
+            <p:ph type="sldNum" sz="quarter" idx="5"/>
+          </p:nvPr>
+        </p:nvSpPr>
+        <p:spPr/>
+        <p:txBody>
+          <a:bodyPr/>
+          <a:lstStyle/>
+          <a:p>
+            <a:fld id="{C20589B6-2077-F44F-8FD6-3E6CA72E71C7}" type="slidenum">
+              <a:rPr lang="de-DE" smtClean="0"/>
+              <a:t>19</a:t>
+            </a:fld>
+            <a:endParaRPr lang="de-DE"/>
+          </a:p>
+        </p:txBody>
+      </p:sp>
+    </p:spTree>
+    <p:extLst>
+      <p:ext uri="{BB962C8B-B14F-4D97-AF65-F5344CB8AC3E}">
+        <p14:creationId xmlns:p14="http://schemas.microsoft.com/office/powerpoint/2010/main" val="2078989767"/>
       </p:ext>
     </p:extLst>
   </p:cSld>
@@ -3930,7 +4514,7 @@
           <a:p>
             <a:fld id="{890712FB-6C2B-FF40-98F1-31D1BEB059C4}" type="datetime1">
               <a:rPr lang="de-DE" smtClean="0"/>
-              <a:t>30.10.23</a:t>
+              <a:t>06.11.23</a:t>
             </a:fld>
             <a:endParaRPr lang="de-DE"/>
           </a:p>
@@ -4139,7 +4723,7 @@
           <a:p>
             <a:fld id="{54D64BCA-8606-6E49-A713-F8FD4EE513EF}" type="datetime1">
               <a:rPr lang="de-DE" smtClean="0"/>
-              <a:t>30.10.23</a:t>
+              <a:t>06.11.23</a:t>
             </a:fld>
             <a:endParaRPr lang="de-DE"/>
           </a:p>
@@ -4358,7 +4942,7 @@
           <a:p>
             <a:fld id="{97ED5148-4B0B-9040-B3A5-B996031EAECB}" type="datetime1">
               <a:rPr lang="de-DE" smtClean="0"/>
-              <a:t>30.10.23</a:t>
+              <a:t>06.11.23</a:t>
             </a:fld>
             <a:endParaRPr lang="de-DE"/>
           </a:p>
@@ -4482,7 +5066,7 @@
           <a:p>
             <a:fld id="{6519A599-967A-FC49-9D40-89D0BC378350}" type="datetime1">
               <a:rPr lang="de-DE" smtClean="0"/>
-              <a:t>30.10.23</a:t>
+              <a:t>06.11.23</a:t>
             </a:fld>
             <a:endParaRPr lang="de-DE"/>
           </a:p>
@@ -4752,35 +5336,35 @@
           <a:p>
             <a:pPr lvl="0"/>
             <a:r>
-              <a:rPr lang="de-DE"/>
+              <a:rPr lang="de-DE" dirty="0"/>
               <a:t>Mastertextformat bearbeiten</a:t>
             </a:r>
           </a:p>
           <a:p>
             <a:pPr lvl="1"/>
             <a:r>
-              <a:rPr lang="de-DE"/>
+              <a:rPr lang="de-DE" dirty="0"/>
               <a:t>Zweite Ebene</a:t>
             </a:r>
           </a:p>
           <a:p>
             <a:pPr lvl="2"/>
             <a:r>
-              <a:rPr lang="de-DE"/>
+              <a:rPr lang="de-DE" dirty="0"/>
               <a:t>Dritte Ebene</a:t>
             </a:r>
           </a:p>
           <a:p>
             <a:pPr lvl="3"/>
             <a:r>
-              <a:rPr lang="de-DE"/>
+              <a:rPr lang="de-DE" dirty="0"/>
               <a:t>Vierte Ebene</a:t>
             </a:r>
           </a:p>
           <a:p>
             <a:pPr lvl="4"/>
             <a:r>
-              <a:rPr lang="de-DE"/>
+              <a:rPr lang="de-DE" dirty="0"/>
               <a:t>Fünfte Ebene</a:t>
             </a:r>
           </a:p>
@@ -4809,7 +5393,7 @@
           <a:p>
             <a:fld id="{810B8866-FDA1-CF4B-81CC-77ABF5682171}" type="datetime1">
               <a:rPr lang="de-DE" smtClean="0"/>
-              <a:t>30.10.23</a:t>
+              <a:t>06.11.23</a:t>
             </a:fld>
             <a:endParaRPr lang="de-DE"/>
           </a:p>
@@ -5095,7 +5679,7 @@
           <a:p>
             <a:fld id="{C61FAE3F-9BAB-F641-89D5-CAF5FF11D633}" type="datetime1">
               <a:rPr lang="de-DE" smtClean="0"/>
-              <a:t>30.10.23</a:t>
+              <a:t>06.11.23</a:t>
             </a:fld>
             <a:endParaRPr lang="de-DE"/>
           </a:p>
@@ -5371,7 +5955,7 @@
           <a:p>
             <a:fld id="{CC621B88-39E5-E54E-AD97-57FEF547783D}" type="datetime1">
               <a:rPr lang="de-DE" smtClean="0"/>
-              <a:t>30.10.23</a:t>
+              <a:t>06.11.23</a:t>
             </a:fld>
             <a:endParaRPr lang="de-DE"/>
           </a:p>
@@ -5794,7 +6378,7 @@
           <a:p>
             <a:fld id="{BC328AC9-688C-3E47-82F4-C0EAA1776770}" type="datetime1">
               <a:rPr lang="de-DE" smtClean="0"/>
-              <a:t>30.10.23</a:t>
+              <a:t>06.11.23</a:t>
             </a:fld>
             <a:endParaRPr lang="de-DE"/>
           </a:p>
@@ -5946,7 +6530,7 @@
           <a:p>
             <a:fld id="{650A18A0-7183-0E48-888F-FBBE47F2D103}" type="datetime1">
               <a:rPr lang="de-DE" smtClean="0"/>
-              <a:t>30.10.23</a:t>
+              <a:t>06.11.23</a:t>
             </a:fld>
             <a:endParaRPr lang="de-DE"/>
           </a:p>
@@ -6070,7 +6654,7 @@
           <a:p>
             <a:fld id="{1930F987-7D93-0147-8816-E7245C9B3158}" type="datetime1">
               <a:rPr lang="de-DE" smtClean="0"/>
-              <a:t>30.10.23</a:t>
+              <a:t>06.11.23</a:t>
             </a:fld>
             <a:endParaRPr lang="de-DE"/>
           </a:p>
@@ -6392,7 +6976,7 @@
           <a:p>
             <a:fld id="{FD52C128-DDCB-B240-84A5-EA67B28FCB01}" type="datetime1">
               <a:rPr lang="de-DE" smtClean="0"/>
-              <a:t>30.10.23</a:t>
+              <a:t>06.11.23</a:t>
             </a:fld>
             <a:endParaRPr lang="de-DE"/>
           </a:p>
@@ -6691,7 +7275,7 @@
           <a:p>
             <a:fld id="{EDB9E0A2-E75A-CF4A-A93B-5CCE9671B301}" type="datetime1">
               <a:rPr lang="de-DE" smtClean="0"/>
-              <a:t>30.10.23</a:t>
+              <a:t>06.11.23</a:t>
             </a:fld>
             <a:endParaRPr lang="de-DE"/>
           </a:p>
@@ -6995,7 +7579,7 @@
           <a:p>
             <a:fld id="{AE39479D-8C0D-3F48-BDF7-9238A4DA1AB8}" type="datetime1">
               <a:rPr lang="de-DE" smtClean="0"/>
-              <a:t>30.10.23</a:t>
+              <a:t>06.11.23</a:t>
             </a:fld>
             <a:endParaRPr lang="de-DE"/>
           </a:p>
@@ -9041,9 +9625,9 @@
           <a:solidFill>
             <a:schemeClr val="tx1"/>
           </a:solidFill>
-          <a:latin typeface="72 Brand" panose="020B0504030603020204" pitchFamily="34" charset="0"/>
+          <a:latin typeface="Arial" panose="020B0604020202020204" pitchFamily="34" charset="0"/>
           <a:ea typeface="+mn-ea"/>
-          <a:cs typeface="+mn-cs"/>
+          <a:cs typeface="Arial" panose="020B0604020202020204" pitchFamily="34" charset="0"/>
         </a:defRPr>
       </a:lvl1pPr>
       <a:lvl2pPr marL="685800" indent="-228600" algn="l" defTabSz="914400" rtl="0" eaLnBrk="1" latinLnBrk="0" hangingPunct="1">
@@ -9059,9 +9643,9 @@
           <a:solidFill>
             <a:schemeClr val="tx1"/>
           </a:solidFill>
-          <a:latin typeface="72 Brand" panose="020B0504030603020204" pitchFamily="34" charset="0"/>
+          <a:latin typeface="Arial" panose="020B0604020202020204" pitchFamily="34" charset="0"/>
           <a:ea typeface="+mn-ea"/>
-          <a:cs typeface="+mn-cs"/>
+          <a:cs typeface="Arial" panose="020B0604020202020204" pitchFamily="34" charset="0"/>
         </a:defRPr>
       </a:lvl2pPr>
       <a:lvl3pPr marL="1143000" indent="-228600" algn="l" defTabSz="914400" rtl="0" eaLnBrk="1" latinLnBrk="0" hangingPunct="1">
@@ -9077,9 +9661,9 @@
           <a:solidFill>
             <a:schemeClr val="tx1"/>
           </a:solidFill>
-          <a:latin typeface="72 Brand" panose="020B0504030603020204" pitchFamily="34" charset="0"/>
+          <a:latin typeface="Arial" panose="020B0604020202020204" pitchFamily="34" charset="0"/>
           <a:ea typeface="+mn-ea"/>
-          <a:cs typeface="+mn-cs"/>
+          <a:cs typeface="Arial" panose="020B0604020202020204" pitchFamily="34" charset="0"/>
         </a:defRPr>
       </a:lvl3pPr>
       <a:lvl4pPr marL="1600200" indent="-228600" algn="l" defTabSz="914400" rtl="0" eaLnBrk="1" latinLnBrk="0" hangingPunct="1">
@@ -9095,9 +9679,9 @@
           <a:solidFill>
             <a:schemeClr val="tx1"/>
           </a:solidFill>
-          <a:latin typeface="72 Brand" panose="020B0504030603020204" pitchFamily="34" charset="0"/>
+          <a:latin typeface="Arial" panose="020B0604020202020204" pitchFamily="34" charset="0"/>
           <a:ea typeface="+mn-ea"/>
-          <a:cs typeface="+mn-cs"/>
+          <a:cs typeface="Arial" panose="020B0604020202020204" pitchFamily="34" charset="0"/>
         </a:defRPr>
       </a:lvl4pPr>
       <a:lvl5pPr marL="2057400" indent="-228600" algn="l" defTabSz="914400" rtl="0" eaLnBrk="1" latinLnBrk="0" hangingPunct="1">
@@ -9113,9 +9697,9 @@
           <a:solidFill>
             <a:schemeClr val="tx1"/>
           </a:solidFill>
-          <a:latin typeface="72 Brand" panose="020B0504030603020204" pitchFamily="34" charset="0"/>
+          <a:latin typeface="Arial" panose="020B0604020202020204" pitchFamily="34" charset="0"/>
           <a:ea typeface="+mn-ea"/>
-          <a:cs typeface="+mn-cs"/>
+          <a:cs typeface="Arial" panose="020B0604020202020204" pitchFamily="34" charset="0"/>
         </a:defRPr>
       </a:lvl5pPr>
       <a:lvl6pPr marL="2514600" indent="-228600" algn="l" defTabSz="914400" rtl="0" eaLnBrk="1" latinLnBrk="0" hangingPunct="1">
@@ -9555,7 +10139,7 @@
           <a:p>
             <a:fld id="{810B8866-FDA1-CF4B-81CC-77ABF5682171}" type="datetime1">
               <a:rPr lang="de-DE" smtClean="0"/>
-              <a:t>30.10.23</a:t>
+              <a:t>06.11.23</a:t>
             </a:fld>
             <a:endParaRPr lang="de-DE"/>
           </a:p>
@@ -9925,7 +10509,7 @@
           <a:p>
             <a:fld id="{810B8866-FDA1-CF4B-81CC-77ABF5682171}" type="datetime1">
               <a:rPr lang="de-DE" smtClean="0"/>
-              <a:t>30.10.23</a:t>
+              <a:t>06.11.23</a:t>
             </a:fld>
             <a:endParaRPr lang="de-DE"/>
           </a:p>
@@ -10071,7 +10655,7 @@
           <a:p>
             <a:fld id="{810B8866-FDA1-CF4B-81CC-77ABF5682171}" type="datetime1">
               <a:rPr lang="de-DE" smtClean="0"/>
-              <a:t>30.10.23</a:t>
+              <a:t>06.11.23</a:t>
             </a:fld>
             <a:endParaRPr lang="de-DE"/>
           </a:p>
@@ -11240,7 +11824,7 @@
           <a:p>
             <a:fld id="{810B8866-FDA1-CF4B-81CC-77ABF5682171}" type="datetime1">
               <a:rPr lang="de-DE" smtClean="0"/>
-              <a:t>30.10.23</a:t>
+              <a:t>06.11.23</a:t>
             </a:fld>
             <a:endParaRPr lang="de-DE"/>
           </a:p>
@@ -11335,10 +11919,10 @@
       </p:grpSpPr>
       <p:sp>
         <p:nvSpPr>
-          <p:cNvPr id="2" name="Datumsplatzhalter 1">
+          <p:cNvPr id="2" name="Titel 1">
             <a:extLst>
               <a:ext uri="{FF2B5EF4-FFF2-40B4-BE49-F238E27FC236}">
-                <a16:creationId xmlns:a16="http://schemas.microsoft.com/office/drawing/2014/main" id="{6DC77F81-C74E-7ADE-1D2A-E9DF0528675F}"/>
+                <a16:creationId xmlns:a16="http://schemas.microsoft.com/office/drawing/2014/main" id="{C7957E3D-D7C3-C8A2-55C0-0BD7430F52F1}"/>
               </a:ext>
             </a:extLst>
           </p:cNvPr>
@@ -11346,28 +11930,29 @@
             <a:spLocks noGrp="1"/>
           </p:cNvSpPr>
           <p:nvPr>
-            <p:ph type="dt" sz="half" idx="10"/>
+            <p:ph type="title"/>
           </p:nvPr>
         </p:nvSpPr>
         <p:spPr/>
         <p:txBody>
-          <a:bodyPr/>
+          <a:bodyPr>
+            <a:normAutofit fontScale="90000"/>
+          </a:bodyPr>
           <a:lstStyle/>
           <a:p>
-            <a:fld id="{833798E6-D6E8-0944-B30F-079EEF181697}" type="datetime1">
-              <a:rPr lang="de-DE" smtClean="0"/>
-              <a:t>30.10.23</a:t>
-            </a:fld>
-            <a:endParaRPr lang="de-DE"/>
-          </a:p>
-        </p:txBody>
-      </p:sp>
-      <p:sp>
-        <p:nvSpPr>
-          <p:cNvPr id="3" name="Fußzeilenplatzhalter 2">
+            <a:r>
+              <a:rPr lang="de-DE" dirty="0"/>
+              <a:t>Vertriebsorganisation – Präzisierung</a:t>
+            </a:r>
+          </a:p>
+        </p:txBody>
+      </p:sp>
+      <p:sp>
+        <p:nvSpPr>
+          <p:cNvPr id="3" name="Inhaltsplatzhalter 2">
             <a:extLst>
               <a:ext uri="{FF2B5EF4-FFF2-40B4-BE49-F238E27FC236}">
-                <a16:creationId xmlns:a16="http://schemas.microsoft.com/office/drawing/2014/main" id="{C9966194-5A1A-7E17-05EE-6F819BDBB60B}"/>
+                <a16:creationId xmlns:a16="http://schemas.microsoft.com/office/drawing/2014/main" id="{15083A2A-18AC-8768-50E4-3A4FDFCD0BB0}"/>
               </a:ext>
             </a:extLst>
           </p:cNvPr>
@@ -11375,27 +11960,122 @@
             <a:spLocks noGrp="1"/>
           </p:cNvSpPr>
           <p:nvPr>
-            <p:ph type="ftr" sz="quarter" idx="11"/>
+            <p:ph idx="1"/>
           </p:nvPr>
         </p:nvSpPr>
         <p:spPr/>
         <p:txBody>
-          <a:bodyPr/>
+          <a:bodyPr>
+            <a:noAutofit/>
+          </a:bodyPr>
           <a:lstStyle/>
           <a:p>
-            <a:r>
-              <a:rPr lang="de-DE"/>
-              <a:t>Sonnengold Solutions GmbH © 2023</a:t>
-            </a:r>
-          </a:p>
-        </p:txBody>
-      </p:sp>
-      <p:sp>
-        <p:nvSpPr>
-          <p:cNvPr id="4" name="Foliennummernplatzhalter 3">
+            <a:pPr marL="0" indent="0">
+              <a:lnSpc>
+                <a:spcPct val="115000"/>
+              </a:lnSpc>
+              <a:buNone/>
+            </a:pPr>
+            <a:r>
+              <a:rPr lang="de-DE" sz="2000" b="1" kern="100" dirty="0">
+                <a:effectLst/>
+                <a:ea typeface="Calibri" panose="020F0502020204030204" pitchFamily="34" charset="0"/>
+              </a:rPr>
+              <a:t>Funktionen/Stellen: </a:t>
+            </a:r>
+          </a:p>
+          <a:p>
+            <a:pPr>
+              <a:lnSpc>
+                <a:spcPct val="115000"/>
+              </a:lnSpc>
+            </a:pPr>
+            <a:r>
+              <a:rPr lang="de-DE" sz="2000" u="sng" kern="100" dirty="0">
+                <a:effectLst/>
+                <a:ea typeface="Calibri" panose="020F0502020204030204" pitchFamily="34" charset="0"/>
+              </a:rPr>
+              <a:t>Vertriebsleiter</a:t>
+            </a:r>
+            <a:r>
+              <a:rPr lang="de-DE" sz="2000" kern="100" dirty="0">
+                <a:effectLst/>
+                <a:ea typeface="Calibri" panose="020F0502020204030204" pitchFamily="34" charset="0"/>
+              </a:rPr>
+              <a:t>: Leitet und koordiniert das Vertriebsteam, setzt Vertriebsstrategien um</a:t>
+            </a:r>
+          </a:p>
+          <a:p>
+            <a:pPr>
+              <a:lnSpc>
+                <a:spcPct val="115000"/>
+              </a:lnSpc>
+            </a:pPr>
+            <a:r>
+              <a:rPr lang="de-DE" sz="2000" u="sng" kern="100" dirty="0">
+                <a:effectLst/>
+                <a:ea typeface="Calibri" panose="020F0502020204030204" pitchFamily="34" charset="0"/>
+              </a:rPr>
+              <a:t>Key Account Manager (KAM)</a:t>
+            </a:r>
+            <a:r>
+              <a:rPr lang="de-DE" sz="2000" kern="100" dirty="0">
+                <a:effectLst/>
+                <a:ea typeface="Calibri" panose="020F0502020204030204" pitchFamily="34" charset="0"/>
+              </a:rPr>
+              <a:t>: Betreut Schlüsselkunden und baut langfristige Beziehungen auf</a:t>
+            </a:r>
+          </a:p>
+          <a:p>
+            <a:pPr>
+              <a:lnSpc>
+                <a:spcPct val="115000"/>
+              </a:lnSpc>
+            </a:pPr>
+            <a:r>
+              <a:rPr lang="de-DE" sz="2000" u="sng" kern="100" dirty="0">
+                <a:effectLst/>
+                <a:ea typeface="Calibri" panose="020F0502020204030204" pitchFamily="34" charset="0"/>
+              </a:rPr>
+              <a:t>Technische Vertriebsmitarbeiter/Außendienstmitarbeiter</a:t>
+            </a:r>
+            <a:r>
+              <a:rPr lang="de-DE" sz="2000" kern="100" dirty="0">
+                <a:effectLst/>
+                <a:ea typeface="Calibri" panose="020F0502020204030204" pitchFamily="34" charset="0"/>
+              </a:rPr>
+              <a:t>: Identifizieren neue Geschäftsmöglichkeiten, bieten technische Beratung und verhandeln Verträge</a:t>
+            </a:r>
+          </a:p>
+          <a:p>
+            <a:pPr>
+              <a:lnSpc>
+                <a:spcPct val="115000"/>
+              </a:lnSpc>
+            </a:pPr>
+            <a:r>
+              <a:rPr lang="de-DE" sz="2000" u="sng" kern="100" dirty="0">
+                <a:effectLst/>
+                <a:ea typeface="Calibri" panose="020F0502020204030204" pitchFamily="34" charset="0"/>
+              </a:rPr>
+              <a:t>Vertriebsinnendienstmitarbeiter</a:t>
+            </a:r>
+            <a:r>
+              <a:rPr lang="de-DE" sz="2000" kern="100" dirty="0">
+                <a:effectLst/>
+                <a:ea typeface="Calibri" panose="020F0502020204030204" pitchFamily="34" charset="0"/>
+              </a:rPr>
+              <a:t>: Unterstützen den Vertrieb mit administrativen Aufgaben und Kundenservice</a:t>
+            </a:r>
+          </a:p>
+        </p:txBody>
+      </p:sp>
+      <p:sp>
+        <p:nvSpPr>
+          <p:cNvPr id="4" name="Datumsplatzhalter 3">
             <a:extLst>
               <a:ext uri="{FF2B5EF4-FFF2-40B4-BE49-F238E27FC236}">
-                <a16:creationId xmlns:a16="http://schemas.microsoft.com/office/drawing/2014/main" id="{AA19E0C4-D630-F739-2A0E-B264FE53C398}"/>
+                <a16:creationId xmlns:a16="http://schemas.microsoft.com/office/drawing/2014/main" id="{EAEB8385-2A3B-CD17-259B-24405538FCA4}"/>
               </a:ext>
             </a:extLst>
           </p:cNvPr>
@@ -11403,7 +12083,7 @@
             <a:spLocks noGrp="1"/>
           </p:cNvSpPr>
           <p:nvPr>
-            <p:ph type="sldNum" sz="quarter" idx="12"/>
+            <p:ph type="dt" sz="half" idx="10"/>
           </p:nvPr>
         </p:nvSpPr>
         <p:spPr/>
@@ -11411,9 +12091,65 @@
           <a:bodyPr/>
           <a:lstStyle/>
           <a:p>
+            <a:fld id="{810B8866-FDA1-CF4B-81CC-77ABF5682171}" type="datetime1">
+              <a:rPr lang="de-DE" smtClean="0"/>
+              <a:t>06.11.23</a:t>
+            </a:fld>
+            <a:endParaRPr lang="de-DE" dirty="0"/>
+          </a:p>
+        </p:txBody>
+      </p:sp>
+      <p:sp>
+        <p:nvSpPr>
+          <p:cNvPr id="5" name="Fußzeilenplatzhalter 4">
+            <a:extLst>
+              <a:ext uri="{FF2B5EF4-FFF2-40B4-BE49-F238E27FC236}">
+                <a16:creationId xmlns:a16="http://schemas.microsoft.com/office/drawing/2014/main" id="{85D5D2EC-0B65-1EB8-61D0-DAE869439D31}"/>
+              </a:ext>
+            </a:extLst>
+          </p:cNvPr>
+          <p:cNvSpPr>
+            <a:spLocks noGrp="1"/>
+          </p:cNvSpPr>
+          <p:nvPr>
+            <p:ph type="ftr" sz="quarter" idx="11"/>
+          </p:nvPr>
+        </p:nvSpPr>
+        <p:spPr/>
+        <p:txBody>
+          <a:bodyPr/>
+          <a:lstStyle/>
+          <a:p>
+            <a:r>
+              <a:rPr lang="de-DE"/>
+              <a:t>Sonnengold Solutions GmbH © 2023</a:t>
+            </a:r>
+          </a:p>
+        </p:txBody>
+      </p:sp>
+      <p:sp>
+        <p:nvSpPr>
+          <p:cNvPr id="6" name="Foliennummernplatzhalter 5">
+            <a:extLst>
+              <a:ext uri="{FF2B5EF4-FFF2-40B4-BE49-F238E27FC236}">
+                <a16:creationId xmlns:a16="http://schemas.microsoft.com/office/drawing/2014/main" id="{1C37444D-EC4B-4D0F-F3E2-4B8DEFE7617F}"/>
+              </a:ext>
+            </a:extLst>
+          </p:cNvPr>
+          <p:cNvSpPr>
+            <a:spLocks noGrp="1"/>
+          </p:cNvSpPr>
+          <p:nvPr>
+            <p:ph type="sldNum" sz="quarter" idx="12"/>
+          </p:nvPr>
+        </p:nvSpPr>
+        <p:spPr/>
+        <p:txBody>
+          <a:bodyPr/>
+          <a:lstStyle/>
+          <a:p>
             <a:fld id="{3D3C939C-4408-B746-BB33-D84893A8474B}" type="slidenum">
               <a:rPr lang="de-DE" smtClean="0"/>
-              <a:pPr/>
               <a:t>14</a:t>
             </a:fld>
             <a:endParaRPr lang="de-DE"/>
@@ -11423,7 +12159,1310 @@
     </p:spTree>
     <p:extLst>
       <p:ext uri="{BB962C8B-B14F-4D97-AF65-F5344CB8AC3E}">
-        <p14:creationId xmlns:p14="http://schemas.microsoft.com/office/powerpoint/2010/main" val="1161656540"/>
+        <p14:creationId xmlns:p14="http://schemas.microsoft.com/office/powerpoint/2010/main" val="556458354"/>
+      </p:ext>
+    </p:extLst>
+  </p:cSld>
+  <p:clrMapOvr>
+    <a:masterClrMapping/>
+  </p:clrMapOvr>
+</p:sld>
+</file>
+
+<file path=ppt/slides/slide15.xml><?xml version="1.0" encoding="utf-8"?>
+<p:sld xmlns:a="http://schemas.openxmlformats.org/drawingml/2006/main" xmlns:r="http://schemas.openxmlformats.org/officeDocument/2006/relationships" xmlns:p="http://schemas.openxmlformats.org/presentationml/2006/main">
+  <p:cSld>
+    <p:spTree>
+      <p:nvGrpSpPr>
+        <p:cNvPr id="1" name=""/>
+        <p:cNvGrpSpPr/>
+        <p:nvPr/>
+      </p:nvGrpSpPr>
+      <p:grpSpPr>
+        <a:xfrm>
+          <a:off x="0" y="0"/>
+          <a:ext cx="0" cy="0"/>
+          <a:chOff x="0" y="0"/>
+          <a:chExt cx="0" cy="0"/>
+        </a:xfrm>
+      </p:grpSpPr>
+      <p:sp>
+        <p:nvSpPr>
+          <p:cNvPr id="2" name="Titel 1">
+            <a:extLst>
+              <a:ext uri="{FF2B5EF4-FFF2-40B4-BE49-F238E27FC236}">
+                <a16:creationId xmlns:a16="http://schemas.microsoft.com/office/drawing/2014/main" id="{C7957E3D-D7C3-C8A2-55C0-0BD7430F52F1}"/>
+              </a:ext>
+            </a:extLst>
+          </p:cNvPr>
+          <p:cNvSpPr>
+            <a:spLocks noGrp="1"/>
+          </p:cNvSpPr>
+          <p:nvPr>
+            <p:ph type="title"/>
+          </p:nvPr>
+        </p:nvSpPr>
+        <p:spPr/>
+        <p:txBody>
+          <a:bodyPr>
+            <a:normAutofit fontScale="90000"/>
+          </a:bodyPr>
+          <a:lstStyle/>
+          <a:p>
+            <a:r>
+              <a:rPr lang="de-DE" dirty="0"/>
+              <a:t>Vertriebsorganisation – Präzisierung</a:t>
+            </a:r>
+          </a:p>
+        </p:txBody>
+      </p:sp>
+      <p:sp>
+        <p:nvSpPr>
+          <p:cNvPr id="3" name="Inhaltsplatzhalter 2">
+            <a:extLst>
+              <a:ext uri="{FF2B5EF4-FFF2-40B4-BE49-F238E27FC236}">
+                <a16:creationId xmlns:a16="http://schemas.microsoft.com/office/drawing/2014/main" id="{15083A2A-18AC-8768-50E4-3A4FDFCD0BB0}"/>
+              </a:ext>
+            </a:extLst>
+          </p:cNvPr>
+          <p:cNvSpPr>
+            <a:spLocks noGrp="1"/>
+          </p:cNvSpPr>
+          <p:nvPr>
+            <p:ph idx="1"/>
+          </p:nvPr>
+        </p:nvSpPr>
+        <p:spPr/>
+        <p:txBody>
+          <a:bodyPr>
+            <a:noAutofit/>
+          </a:bodyPr>
+          <a:lstStyle/>
+          <a:p>
+            <a:pPr>
+              <a:lnSpc>
+                <a:spcPct val="115000"/>
+              </a:lnSpc>
+            </a:pPr>
+            <a:r>
+              <a:rPr lang="de-DE" sz="2000" u="sng" kern="100" dirty="0">
+                <a:effectLst/>
+                <a:ea typeface="Calibri" panose="020F0502020204030204" pitchFamily="34" charset="0"/>
+              </a:rPr>
+              <a:t>Mitarbeiterzahl</a:t>
+            </a:r>
+            <a:r>
+              <a:rPr lang="de-DE" sz="2000" kern="100" dirty="0">
+                <a:effectLst/>
+                <a:ea typeface="Calibri" panose="020F0502020204030204" pitchFamily="34" charset="0"/>
+              </a:rPr>
+              <a:t>: In der Anfangszeit: Vertriebsleiter, 2 KAMs, 5 Vertriebsmitarbeiter, 3 Vertriebsinnendienstmitarbeiter. Im Laufe von 3 Jahren: Erweiterung um 2 KAMs und 3 Vertriebsmitarbeiter.</a:t>
+            </a:r>
+          </a:p>
+          <a:p>
+            <a:pPr>
+              <a:lnSpc>
+                <a:spcPct val="115000"/>
+              </a:lnSpc>
+            </a:pPr>
+            <a:r>
+              <a:rPr lang="de-DE" sz="2000" u="sng" kern="100" dirty="0">
+                <a:effectLst/>
+                <a:ea typeface="Calibri" panose="020F0502020204030204" pitchFamily="34" charset="0"/>
+              </a:rPr>
+              <a:t>Verankerung im Unternehmen</a:t>
+            </a:r>
+            <a:r>
+              <a:rPr lang="de-DE" sz="2000" kern="100" dirty="0">
+                <a:effectLst/>
+                <a:ea typeface="Calibri" panose="020F0502020204030204" pitchFamily="34" charset="0"/>
+              </a:rPr>
+              <a:t>: Der Vertrieb ist ein integrierter Bestandteil des Unternehmens, mit direktem Bericht an die Geschäftsführung.</a:t>
+            </a:r>
+          </a:p>
+          <a:p>
+            <a:pPr>
+              <a:lnSpc>
+                <a:spcPct val="115000"/>
+              </a:lnSpc>
+            </a:pPr>
+            <a:r>
+              <a:rPr lang="de-DE" sz="2000" u="sng" kern="100" dirty="0">
+                <a:effectLst/>
+                <a:ea typeface="Calibri" panose="020F0502020204030204" pitchFamily="34" charset="0"/>
+              </a:rPr>
+              <a:t>Regionale Aufteilung</a:t>
+            </a:r>
+            <a:r>
+              <a:rPr lang="de-DE" sz="2000" kern="100" dirty="0">
+                <a:effectLst/>
+                <a:ea typeface="Calibri" panose="020F0502020204030204" pitchFamily="34" charset="0"/>
+              </a:rPr>
+              <a:t>: Anfangs regional, später bundesweit und international.</a:t>
+            </a:r>
+          </a:p>
+          <a:p>
+            <a:pPr>
+              <a:lnSpc>
+                <a:spcPct val="115000"/>
+              </a:lnSpc>
+            </a:pPr>
+            <a:r>
+              <a:rPr lang="de-DE" sz="2000" u="sng" kern="100" dirty="0">
+                <a:effectLst/>
+                <a:ea typeface="Calibri" panose="020F0502020204030204" pitchFamily="34" charset="0"/>
+              </a:rPr>
+              <a:t>Partner</a:t>
+            </a:r>
+            <a:r>
+              <a:rPr lang="de-DE" sz="2000" kern="100" dirty="0">
+                <a:effectLst/>
+                <a:ea typeface="Calibri" panose="020F0502020204030204" pitchFamily="34" charset="0"/>
+              </a:rPr>
+              <a:t>: Kooperationen mit Herstellern erneuerbarer Energielösungen und Installationsunternehmen.</a:t>
+            </a:r>
+          </a:p>
+          <a:p>
+            <a:pPr>
+              <a:lnSpc>
+                <a:spcPct val="115000"/>
+              </a:lnSpc>
+              <a:spcAft>
+                <a:spcPts val="800"/>
+              </a:spcAft>
+            </a:pPr>
+            <a:r>
+              <a:rPr lang="de-DE" sz="2000" u="sng" kern="100" dirty="0">
+                <a:effectLst/>
+                <a:ea typeface="Calibri" panose="020F0502020204030204" pitchFamily="34" charset="0"/>
+              </a:rPr>
+              <a:t>Direkt/indirekt</a:t>
+            </a:r>
+            <a:r>
+              <a:rPr lang="de-DE" sz="2000" kern="100" dirty="0">
+                <a:effectLst/>
+                <a:ea typeface="Calibri" panose="020F0502020204030204" pitchFamily="34" charset="0"/>
+              </a:rPr>
+              <a:t>: Hauptsächlich direkter Vertrieb an Großkunden, indirekter Vertrieb durch Partner im Privatkundensegment.</a:t>
+            </a:r>
+          </a:p>
+        </p:txBody>
+      </p:sp>
+      <p:sp>
+        <p:nvSpPr>
+          <p:cNvPr id="4" name="Datumsplatzhalter 3">
+            <a:extLst>
+              <a:ext uri="{FF2B5EF4-FFF2-40B4-BE49-F238E27FC236}">
+                <a16:creationId xmlns:a16="http://schemas.microsoft.com/office/drawing/2014/main" id="{EAEB8385-2A3B-CD17-259B-24405538FCA4}"/>
+              </a:ext>
+            </a:extLst>
+          </p:cNvPr>
+          <p:cNvSpPr>
+            <a:spLocks noGrp="1"/>
+          </p:cNvSpPr>
+          <p:nvPr>
+            <p:ph type="dt" sz="half" idx="10"/>
+          </p:nvPr>
+        </p:nvSpPr>
+        <p:spPr/>
+        <p:txBody>
+          <a:bodyPr/>
+          <a:lstStyle/>
+          <a:p>
+            <a:fld id="{810B8866-FDA1-CF4B-81CC-77ABF5682171}" type="datetime1">
+              <a:rPr lang="de-DE" smtClean="0"/>
+              <a:t>06.11.23</a:t>
+            </a:fld>
+            <a:endParaRPr lang="de-DE" dirty="0"/>
+          </a:p>
+        </p:txBody>
+      </p:sp>
+      <p:sp>
+        <p:nvSpPr>
+          <p:cNvPr id="5" name="Fußzeilenplatzhalter 4">
+            <a:extLst>
+              <a:ext uri="{FF2B5EF4-FFF2-40B4-BE49-F238E27FC236}">
+                <a16:creationId xmlns:a16="http://schemas.microsoft.com/office/drawing/2014/main" id="{85D5D2EC-0B65-1EB8-61D0-DAE869439D31}"/>
+              </a:ext>
+            </a:extLst>
+          </p:cNvPr>
+          <p:cNvSpPr>
+            <a:spLocks noGrp="1"/>
+          </p:cNvSpPr>
+          <p:nvPr>
+            <p:ph type="ftr" sz="quarter" idx="11"/>
+          </p:nvPr>
+        </p:nvSpPr>
+        <p:spPr/>
+        <p:txBody>
+          <a:bodyPr/>
+          <a:lstStyle/>
+          <a:p>
+            <a:r>
+              <a:rPr lang="de-DE"/>
+              <a:t>Sonnengold Solutions GmbH © 2023</a:t>
+            </a:r>
+          </a:p>
+        </p:txBody>
+      </p:sp>
+      <p:sp>
+        <p:nvSpPr>
+          <p:cNvPr id="6" name="Foliennummernplatzhalter 5">
+            <a:extLst>
+              <a:ext uri="{FF2B5EF4-FFF2-40B4-BE49-F238E27FC236}">
+                <a16:creationId xmlns:a16="http://schemas.microsoft.com/office/drawing/2014/main" id="{1C37444D-EC4B-4D0F-F3E2-4B8DEFE7617F}"/>
+              </a:ext>
+            </a:extLst>
+          </p:cNvPr>
+          <p:cNvSpPr>
+            <a:spLocks noGrp="1"/>
+          </p:cNvSpPr>
+          <p:nvPr>
+            <p:ph type="sldNum" sz="quarter" idx="12"/>
+          </p:nvPr>
+        </p:nvSpPr>
+        <p:spPr/>
+        <p:txBody>
+          <a:bodyPr/>
+          <a:lstStyle/>
+          <a:p>
+            <a:fld id="{3D3C939C-4408-B746-BB33-D84893A8474B}" type="slidenum">
+              <a:rPr lang="de-DE" smtClean="0"/>
+              <a:t>15</a:t>
+            </a:fld>
+            <a:endParaRPr lang="de-DE"/>
+          </a:p>
+        </p:txBody>
+      </p:sp>
+    </p:spTree>
+    <p:extLst>
+      <p:ext uri="{BB962C8B-B14F-4D97-AF65-F5344CB8AC3E}">
+        <p14:creationId xmlns:p14="http://schemas.microsoft.com/office/powerpoint/2010/main" val="2166135483"/>
+      </p:ext>
+    </p:extLst>
+  </p:cSld>
+  <p:clrMapOvr>
+    <a:masterClrMapping/>
+  </p:clrMapOvr>
+</p:sld>
+</file>
+
+<file path=ppt/slides/slide16.xml><?xml version="1.0" encoding="utf-8"?>
+<p:sld xmlns:a="http://schemas.openxmlformats.org/drawingml/2006/main" xmlns:r="http://schemas.openxmlformats.org/officeDocument/2006/relationships" xmlns:p="http://schemas.openxmlformats.org/presentationml/2006/main">
+  <p:cSld>
+    <p:spTree>
+      <p:nvGrpSpPr>
+        <p:cNvPr id="1" name=""/>
+        <p:cNvGrpSpPr/>
+        <p:nvPr/>
+      </p:nvGrpSpPr>
+      <p:grpSpPr>
+        <a:xfrm>
+          <a:off x="0" y="0"/>
+          <a:ext cx="0" cy="0"/>
+          <a:chOff x="0" y="0"/>
+          <a:chExt cx="0" cy="0"/>
+        </a:xfrm>
+      </p:grpSpPr>
+      <p:sp>
+        <p:nvSpPr>
+          <p:cNvPr id="2" name="Titel 1">
+            <a:extLst>
+              <a:ext uri="{FF2B5EF4-FFF2-40B4-BE49-F238E27FC236}">
+                <a16:creationId xmlns:a16="http://schemas.microsoft.com/office/drawing/2014/main" id="{C7957E3D-D7C3-C8A2-55C0-0BD7430F52F1}"/>
+              </a:ext>
+            </a:extLst>
+          </p:cNvPr>
+          <p:cNvSpPr>
+            <a:spLocks noGrp="1"/>
+          </p:cNvSpPr>
+          <p:nvPr>
+            <p:ph type="title"/>
+          </p:nvPr>
+        </p:nvSpPr>
+        <p:spPr/>
+        <p:txBody>
+          <a:bodyPr>
+            <a:normAutofit fontScale="90000"/>
+          </a:bodyPr>
+          <a:lstStyle/>
+          <a:p>
+            <a:r>
+              <a:rPr lang="de-DE" dirty="0"/>
+              <a:t>Vertriebsorganisation – Qualifikation</a:t>
+            </a:r>
+          </a:p>
+        </p:txBody>
+      </p:sp>
+      <p:sp>
+        <p:nvSpPr>
+          <p:cNvPr id="3" name="Inhaltsplatzhalter 2">
+            <a:extLst>
+              <a:ext uri="{FF2B5EF4-FFF2-40B4-BE49-F238E27FC236}">
+                <a16:creationId xmlns:a16="http://schemas.microsoft.com/office/drawing/2014/main" id="{15083A2A-18AC-8768-50E4-3A4FDFCD0BB0}"/>
+              </a:ext>
+            </a:extLst>
+          </p:cNvPr>
+          <p:cNvSpPr>
+            <a:spLocks noGrp="1"/>
+          </p:cNvSpPr>
+          <p:nvPr>
+            <p:ph idx="1"/>
+          </p:nvPr>
+        </p:nvSpPr>
+        <p:spPr/>
+        <p:txBody>
+          <a:bodyPr>
+            <a:normAutofit/>
+          </a:bodyPr>
+          <a:lstStyle/>
+          <a:p>
+            <a:pPr marL="342900" lvl="0" indent="-342900">
+              <a:lnSpc>
+                <a:spcPct val="115000"/>
+              </a:lnSpc>
+              <a:buFont typeface="Symbol" pitchFamily="2" charset="2"/>
+              <a:buChar char=""/>
+            </a:pPr>
+            <a:r>
+              <a:rPr lang="de-DE" sz="2000" u="sng" kern="100" dirty="0">
+                <a:effectLst/>
+                <a:ea typeface="Calibri" panose="020F0502020204030204" pitchFamily="34" charset="0"/>
+              </a:rPr>
+              <a:t>Vertriebsleiter</a:t>
+            </a:r>
+            <a:r>
+              <a:rPr lang="de-DE" sz="2000" kern="100" dirty="0">
+                <a:effectLst/>
+                <a:ea typeface="Calibri" panose="020F0502020204030204" pitchFamily="34" charset="0"/>
+              </a:rPr>
+              <a:t>: Erfahrung im Vertriebsmanagement, strategisches Denken, Führungsfähigkeiten.</a:t>
+            </a:r>
+          </a:p>
+          <a:p>
+            <a:pPr marL="342900" lvl="0" indent="-342900">
+              <a:lnSpc>
+                <a:spcPct val="115000"/>
+              </a:lnSpc>
+              <a:buFont typeface="Symbol" pitchFamily="2" charset="2"/>
+              <a:buChar char=""/>
+            </a:pPr>
+            <a:r>
+              <a:rPr lang="de-DE" sz="2000" u="sng" kern="100" dirty="0">
+                <a:effectLst/>
+                <a:ea typeface="Calibri" panose="020F0502020204030204" pitchFamily="34" charset="0"/>
+              </a:rPr>
+              <a:t>Key Account Manager (KAM)</a:t>
+            </a:r>
+            <a:r>
+              <a:rPr lang="de-DE" sz="2000" kern="100" dirty="0">
+                <a:effectLst/>
+                <a:ea typeface="Calibri" panose="020F0502020204030204" pitchFamily="34" charset="0"/>
+              </a:rPr>
+              <a:t>: Verhandlungsgeschick, Beziehungsaufbau, technisches Verständnis, Kundenorientierung.</a:t>
+            </a:r>
+          </a:p>
+          <a:p>
+            <a:pPr marL="342900" lvl="0" indent="-342900">
+              <a:lnSpc>
+                <a:spcPct val="115000"/>
+              </a:lnSpc>
+              <a:buFont typeface="Symbol" pitchFamily="2" charset="2"/>
+              <a:buChar char=""/>
+            </a:pPr>
+            <a:r>
+              <a:rPr lang="de-DE" sz="2000" u="sng" kern="100" dirty="0">
+                <a:effectLst/>
+                <a:ea typeface="Calibri" panose="020F0502020204030204" pitchFamily="34" charset="0"/>
+              </a:rPr>
+              <a:t>Technische Vertriebsmitarbeiter/Außendienstmitarbeiter</a:t>
+            </a:r>
+            <a:r>
+              <a:rPr lang="de-DE" sz="2000" kern="100" dirty="0">
+                <a:effectLst/>
+                <a:ea typeface="Calibri" panose="020F0502020204030204" pitchFamily="34" charset="0"/>
+              </a:rPr>
+              <a:t>: Technische Qualifikationen, Vertriebserfahrung, Kommunikationsfähigkeiten.</a:t>
+            </a:r>
+          </a:p>
+          <a:p>
+            <a:pPr marL="342900" lvl="0" indent="-342900">
+              <a:lnSpc>
+                <a:spcPct val="115000"/>
+              </a:lnSpc>
+              <a:spcAft>
+                <a:spcPts val="800"/>
+              </a:spcAft>
+              <a:buFont typeface="Symbol" pitchFamily="2" charset="2"/>
+              <a:buChar char=""/>
+            </a:pPr>
+            <a:r>
+              <a:rPr lang="de-DE" sz="2000" u="sng" kern="100" dirty="0">
+                <a:effectLst/>
+                <a:ea typeface="Calibri" panose="020F0502020204030204" pitchFamily="34" charset="0"/>
+              </a:rPr>
+              <a:t>Vertriebsinnendienstmitarbeiter</a:t>
+            </a:r>
+            <a:r>
+              <a:rPr lang="de-DE" sz="2000" kern="100" dirty="0">
+                <a:effectLst/>
+                <a:ea typeface="Calibri" panose="020F0502020204030204" pitchFamily="34" charset="0"/>
+              </a:rPr>
+              <a:t>: Kundenorientierung, organisatorische Fähigkeiten, Produktkenntnisse.</a:t>
+            </a:r>
+          </a:p>
+        </p:txBody>
+      </p:sp>
+      <p:sp>
+        <p:nvSpPr>
+          <p:cNvPr id="4" name="Datumsplatzhalter 3">
+            <a:extLst>
+              <a:ext uri="{FF2B5EF4-FFF2-40B4-BE49-F238E27FC236}">
+                <a16:creationId xmlns:a16="http://schemas.microsoft.com/office/drawing/2014/main" id="{EAEB8385-2A3B-CD17-259B-24405538FCA4}"/>
+              </a:ext>
+            </a:extLst>
+          </p:cNvPr>
+          <p:cNvSpPr>
+            <a:spLocks noGrp="1"/>
+          </p:cNvSpPr>
+          <p:nvPr>
+            <p:ph type="dt" sz="half" idx="10"/>
+          </p:nvPr>
+        </p:nvSpPr>
+        <p:spPr/>
+        <p:txBody>
+          <a:bodyPr/>
+          <a:lstStyle/>
+          <a:p>
+            <a:fld id="{810B8866-FDA1-CF4B-81CC-77ABF5682171}" type="datetime1">
+              <a:rPr lang="de-DE" smtClean="0"/>
+              <a:t>06.11.23</a:t>
+            </a:fld>
+            <a:endParaRPr lang="de-DE"/>
+          </a:p>
+        </p:txBody>
+      </p:sp>
+      <p:sp>
+        <p:nvSpPr>
+          <p:cNvPr id="5" name="Fußzeilenplatzhalter 4">
+            <a:extLst>
+              <a:ext uri="{FF2B5EF4-FFF2-40B4-BE49-F238E27FC236}">
+                <a16:creationId xmlns:a16="http://schemas.microsoft.com/office/drawing/2014/main" id="{85D5D2EC-0B65-1EB8-61D0-DAE869439D31}"/>
+              </a:ext>
+            </a:extLst>
+          </p:cNvPr>
+          <p:cNvSpPr>
+            <a:spLocks noGrp="1"/>
+          </p:cNvSpPr>
+          <p:nvPr>
+            <p:ph type="ftr" sz="quarter" idx="11"/>
+          </p:nvPr>
+        </p:nvSpPr>
+        <p:spPr/>
+        <p:txBody>
+          <a:bodyPr/>
+          <a:lstStyle/>
+          <a:p>
+            <a:r>
+              <a:rPr lang="de-DE"/>
+              <a:t>Sonnengold Solutions GmbH © 2023</a:t>
+            </a:r>
+          </a:p>
+        </p:txBody>
+      </p:sp>
+      <p:sp>
+        <p:nvSpPr>
+          <p:cNvPr id="6" name="Foliennummernplatzhalter 5">
+            <a:extLst>
+              <a:ext uri="{FF2B5EF4-FFF2-40B4-BE49-F238E27FC236}">
+                <a16:creationId xmlns:a16="http://schemas.microsoft.com/office/drawing/2014/main" id="{1C37444D-EC4B-4D0F-F3E2-4B8DEFE7617F}"/>
+              </a:ext>
+            </a:extLst>
+          </p:cNvPr>
+          <p:cNvSpPr>
+            <a:spLocks noGrp="1"/>
+          </p:cNvSpPr>
+          <p:nvPr>
+            <p:ph type="sldNum" sz="quarter" idx="12"/>
+          </p:nvPr>
+        </p:nvSpPr>
+        <p:spPr/>
+        <p:txBody>
+          <a:bodyPr/>
+          <a:lstStyle/>
+          <a:p>
+            <a:fld id="{3D3C939C-4408-B746-BB33-D84893A8474B}" type="slidenum">
+              <a:rPr lang="de-DE" smtClean="0"/>
+              <a:t>16</a:t>
+            </a:fld>
+            <a:endParaRPr lang="de-DE"/>
+          </a:p>
+        </p:txBody>
+      </p:sp>
+    </p:spTree>
+    <p:extLst>
+      <p:ext uri="{BB962C8B-B14F-4D97-AF65-F5344CB8AC3E}">
+        <p14:creationId xmlns:p14="http://schemas.microsoft.com/office/powerpoint/2010/main" val="1283157994"/>
+      </p:ext>
+    </p:extLst>
+  </p:cSld>
+  <p:clrMapOvr>
+    <a:masterClrMapping/>
+  </p:clrMapOvr>
+</p:sld>
+</file>
+
+<file path=ppt/slides/slide17.xml><?xml version="1.0" encoding="utf-8"?>
+<p:sld xmlns:a="http://schemas.openxmlformats.org/drawingml/2006/main" xmlns:r="http://schemas.openxmlformats.org/officeDocument/2006/relationships" xmlns:p="http://schemas.openxmlformats.org/presentationml/2006/main">
+  <p:cSld>
+    <p:spTree>
+      <p:nvGrpSpPr>
+        <p:cNvPr id="1" name=""/>
+        <p:cNvGrpSpPr/>
+        <p:nvPr/>
+      </p:nvGrpSpPr>
+      <p:grpSpPr>
+        <a:xfrm>
+          <a:off x="0" y="0"/>
+          <a:ext cx="0" cy="0"/>
+          <a:chOff x="0" y="0"/>
+          <a:chExt cx="0" cy="0"/>
+        </a:xfrm>
+      </p:grpSpPr>
+      <p:sp>
+        <p:nvSpPr>
+          <p:cNvPr id="2" name="Titel 1">
+            <a:extLst>
+              <a:ext uri="{FF2B5EF4-FFF2-40B4-BE49-F238E27FC236}">
+                <a16:creationId xmlns:a16="http://schemas.microsoft.com/office/drawing/2014/main" id="{C7957E3D-D7C3-C8A2-55C0-0BD7430F52F1}"/>
+              </a:ext>
+            </a:extLst>
+          </p:cNvPr>
+          <p:cNvSpPr>
+            <a:spLocks noGrp="1"/>
+          </p:cNvSpPr>
+          <p:nvPr>
+            <p:ph type="title"/>
+          </p:nvPr>
+        </p:nvSpPr>
+        <p:spPr/>
+        <p:txBody>
+          <a:bodyPr>
+            <a:normAutofit fontScale="90000"/>
+          </a:bodyPr>
+          <a:lstStyle/>
+          <a:p>
+            <a:r>
+              <a:rPr lang="de-DE" dirty="0"/>
+              <a:t>Vertriebsorganisation – Regeln</a:t>
+            </a:r>
+          </a:p>
+        </p:txBody>
+      </p:sp>
+      <p:sp>
+        <p:nvSpPr>
+          <p:cNvPr id="3" name="Inhaltsplatzhalter 2">
+            <a:extLst>
+              <a:ext uri="{FF2B5EF4-FFF2-40B4-BE49-F238E27FC236}">
+                <a16:creationId xmlns:a16="http://schemas.microsoft.com/office/drawing/2014/main" id="{15083A2A-18AC-8768-50E4-3A4FDFCD0BB0}"/>
+              </a:ext>
+            </a:extLst>
+          </p:cNvPr>
+          <p:cNvSpPr>
+            <a:spLocks noGrp="1"/>
+          </p:cNvSpPr>
+          <p:nvPr>
+            <p:ph idx="1"/>
+          </p:nvPr>
+        </p:nvSpPr>
+        <p:spPr/>
+        <p:txBody>
+          <a:bodyPr>
+            <a:normAutofit/>
+          </a:bodyPr>
+          <a:lstStyle/>
+          <a:p>
+            <a:pPr marL="342900" lvl="0" indent="-342900">
+              <a:lnSpc>
+                <a:spcPct val="115000"/>
+              </a:lnSpc>
+              <a:buFont typeface="Symbol" pitchFamily="2" charset="2"/>
+              <a:buChar char=""/>
+            </a:pPr>
+            <a:r>
+              <a:rPr lang="de-DE" sz="2000" u="sng" kern="100" dirty="0">
+                <a:effectLst/>
+                <a:ea typeface="Calibri" panose="020F0502020204030204" pitchFamily="34" charset="0"/>
+              </a:rPr>
+              <a:t>Kundenorientierung</a:t>
+            </a:r>
+            <a:r>
+              <a:rPr lang="de-DE" sz="2000" kern="100" dirty="0">
+                <a:effectLst/>
+                <a:ea typeface="Calibri" panose="020F0502020204030204" pitchFamily="34" charset="0"/>
+              </a:rPr>
+              <a:t>: Den Kundenbedarf verstehen und maßgeschneiderte Lösungen bieten.</a:t>
+            </a:r>
+          </a:p>
+          <a:p>
+            <a:pPr marL="342900" lvl="0" indent="-342900">
+              <a:lnSpc>
+                <a:spcPct val="115000"/>
+              </a:lnSpc>
+              <a:buFont typeface="Symbol" pitchFamily="2" charset="2"/>
+              <a:buChar char=""/>
+            </a:pPr>
+            <a:r>
+              <a:rPr lang="de-DE" sz="2000" u="sng" kern="100" dirty="0">
+                <a:effectLst/>
+                <a:ea typeface="Calibri" panose="020F0502020204030204" pitchFamily="34" charset="0"/>
+              </a:rPr>
+              <a:t>Kommunikation</a:t>
+            </a:r>
+            <a:r>
+              <a:rPr lang="de-DE" sz="2000" kern="100" dirty="0">
+                <a:effectLst/>
+                <a:ea typeface="Calibri" panose="020F0502020204030204" pitchFamily="34" charset="0"/>
+              </a:rPr>
+              <a:t>: Regelmäßige Abstimmung und Zusammenarbeit im Team.</a:t>
+            </a:r>
+          </a:p>
+          <a:p>
+            <a:pPr marL="342900" lvl="0" indent="-342900">
+              <a:lnSpc>
+                <a:spcPct val="115000"/>
+              </a:lnSpc>
+              <a:buFont typeface="Symbol" pitchFamily="2" charset="2"/>
+              <a:buChar char=""/>
+            </a:pPr>
+            <a:r>
+              <a:rPr lang="de-DE" sz="2000" u="sng" kern="100" dirty="0">
+                <a:effectLst/>
+                <a:ea typeface="Calibri" panose="020F0502020204030204" pitchFamily="34" charset="0"/>
+              </a:rPr>
+              <a:t>Dokumentation</a:t>
+            </a:r>
+            <a:r>
+              <a:rPr lang="de-DE" sz="2000" kern="100" dirty="0">
+                <a:effectLst/>
+                <a:ea typeface="Calibri" panose="020F0502020204030204" pitchFamily="34" charset="0"/>
+              </a:rPr>
+              <a:t>: Sorgfältige Dokumentation von Kundengesprächen und Aktivitäten im CRM-System.</a:t>
+            </a:r>
+          </a:p>
+          <a:p>
+            <a:pPr marL="342900" lvl="0" indent="-342900">
+              <a:lnSpc>
+                <a:spcPct val="115000"/>
+              </a:lnSpc>
+              <a:spcAft>
+                <a:spcPts val="800"/>
+              </a:spcAft>
+              <a:buFont typeface="Symbol" pitchFamily="2" charset="2"/>
+              <a:buChar char=""/>
+            </a:pPr>
+            <a:r>
+              <a:rPr lang="de-DE" sz="2000" u="sng" kern="100" dirty="0">
+                <a:effectLst/>
+                <a:ea typeface="Calibri" panose="020F0502020204030204" pitchFamily="34" charset="0"/>
+              </a:rPr>
+              <a:t>Feedback</a:t>
+            </a:r>
+            <a:r>
+              <a:rPr lang="de-DE" sz="2000" kern="100" dirty="0">
+                <a:effectLst/>
+                <a:ea typeface="Calibri" panose="020F0502020204030204" pitchFamily="34" charset="0"/>
+              </a:rPr>
+              <a:t>: Offene Kommunikation mit anderen Abteilungen, um Kundenfeedback und Marktinformationen weiterzugeben.</a:t>
+            </a:r>
+          </a:p>
+        </p:txBody>
+      </p:sp>
+      <p:sp>
+        <p:nvSpPr>
+          <p:cNvPr id="4" name="Datumsplatzhalter 3">
+            <a:extLst>
+              <a:ext uri="{FF2B5EF4-FFF2-40B4-BE49-F238E27FC236}">
+                <a16:creationId xmlns:a16="http://schemas.microsoft.com/office/drawing/2014/main" id="{EAEB8385-2A3B-CD17-259B-24405538FCA4}"/>
+              </a:ext>
+            </a:extLst>
+          </p:cNvPr>
+          <p:cNvSpPr>
+            <a:spLocks noGrp="1"/>
+          </p:cNvSpPr>
+          <p:nvPr>
+            <p:ph type="dt" sz="half" idx="10"/>
+          </p:nvPr>
+        </p:nvSpPr>
+        <p:spPr/>
+        <p:txBody>
+          <a:bodyPr/>
+          <a:lstStyle/>
+          <a:p>
+            <a:fld id="{810B8866-FDA1-CF4B-81CC-77ABF5682171}" type="datetime1">
+              <a:rPr lang="de-DE" smtClean="0"/>
+              <a:t>06.11.23</a:t>
+            </a:fld>
+            <a:endParaRPr lang="de-DE"/>
+          </a:p>
+        </p:txBody>
+      </p:sp>
+      <p:sp>
+        <p:nvSpPr>
+          <p:cNvPr id="5" name="Fußzeilenplatzhalter 4">
+            <a:extLst>
+              <a:ext uri="{FF2B5EF4-FFF2-40B4-BE49-F238E27FC236}">
+                <a16:creationId xmlns:a16="http://schemas.microsoft.com/office/drawing/2014/main" id="{85D5D2EC-0B65-1EB8-61D0-DAE869439D31}"/>
+              </a:ext>
+            </a:extLst>
+          </p:cNvPr>
+          <p:cNvSpPr>
+            <a:spLocks noGrp="1"/>
+          </p:cNvSpPr>
+          <p:nvPr>
+            <p:ph type="ftr" sz="quarter" idx="11"/>
+          </p:nvPr>
+        </p:nvSpPr>
+        <p:spPr/>
+        <p:txBody>
+          <a:bodyPr/>
+          <a:lstStyle/>
+          <a:p>
+            <a:r>
+              <a:rPr lang="de-DE"/>
+              <a:t>Sonnengold Solutions GmbH © 2023</a:t>
+            </a:r>
+          </a:p>
+        </p:txBody>
+      </p:sp>
+      <p:sp>
+        <p:nvSpPr>
+          <p:cNvPr id="6" name="Foliennummernplatzhalter 5">
+            <a:extLst>
+              <a:ext uri="{FF2B5EF4-FFF2-40B4-BE49-F238E27FC236}">
+                <a16:creationId xmlns:a16="http://schemas.microsoft.com/office/drawing/2014/main" id="{1C37444D-EC4B-4D0F-F3E2-4B8DEFE7617F}"/>
+              </a:ext>
+            </a:extLst>
+          </p:cNvPr>
+          <p:cNvSpPr>
+            <a:spLocks noGrp="1"/>
+          </p:cNvSpPr>
+          <p:nvPr>
+            <p:ph type="sldNum" sz="quarter" idx="12"/>
+          </p:nvPr>
+        </p:nvSpPr>
+        <p:spPr/>
+        <p:txBody>
+          <a:bodyPr/>
+          <a:lstStyle/>
+          <a:p>
+            <a:fld id="{3D3C939C-4408-B746-BB33-D84893A8474B}" type="slidenum">
+              <a:rPr lang="de-DE" smtClean="0"/>
+              <a:t>17</a:t>
+            </a:fld>
+            <a:endParaRPr lang="de-DE"/>
+          </a:p>
+        </p:txBody>
+      </p:sp>
+    </p:spTree>
+    <p:extLst>
+      <p:ext uri="{BB962C8B-B14F-4D97-AF65-F5344CB8AC3E}">
+        <p14:creationId xmlns:p14="http://schemas.microsoft.com/office/powerpoint/2010/main" val="1977673408"/>
+      </p:ext>
+    </p:extLst>
+  </p:cSld>
+  <p:clrMapOvr>
+    <a:masterClrMapping/>
+  </p:clrMapOvr>
+</p:sld>
+</file>
+
+<file path=ppt/slides/slide18.xml><?xml version="1.0" encoding="utf-8"?>
+<p:sld xmlns:a="http://schemas.openxmlformats.org/drawingml/2006/main" xmlns:r="http://schemas.openxmlformats.org/officeDocument/2006/relationships" xmlns:p="http://schemas.openxmlformats.org/presentationml/2006/main">
+  <p:cSld>
+    <p:spTree>
+      <p:nvGrpSpPr>
+        <p:cNvPr id="1" name=""/>
+        <p:cNvGrpSpPr/>
+        <p:nvPr/>
+      </p:nvGrpSpPr>
+      <p:grpSpPr>
+        <a:xfrm>
+          <a:off x="0" y="0"/>
+          <a:ext cx="0" cy="0"/>
+          <a:chOff x="0" y="0"/>
+          <a:chExt cx="0" cy="0"/>
+        </a:xfrm>
+      </p:grpSpPr>
+      <p:sp>
+        <p:nvSpPr>
+          <p:cNvPr id="2" name="Titel 1">
+            <a:extLst>
+              <a:ext uri="{FF2B5EF4-FFF2-40B4-BE49-F238E27FC236}">
+                <a16:creationId xmlns:a16="http://schemas.microsoft.com/office/drawing/2014/main" id="{94EFAEC8-66BC-809C-4186-8F18EFA15EC8}"/>
+              </a:ext>
+            </a:extLst>
+          </p:cNvPr>
+          <p:cNvSpPr>
+            <a:spLocks noGrp="1"/>
+          </p:cNvSpPr>
+          <p:nvPr>
+            <p:ph type="title"/>
+          </p:nvPr>
+        </p:nvSpPr>
+        <p:spPr/>
+        <p:txBody>
+          <a:bodyPr>
+            <a:normAutofit fontScale="90000"/>
+          </a:bodyPr>
+          <a:lstStyle/>
+          <a:p>
+            <a:r>
+              <a:rPr lang="de-DE" dirty="0"/>
+              <a:t>CRM</a:t>
+            </a:r>
+          </a:p>
+        </p:txBody>
+      </p:sp>
+      <p:sp>
+        <p:nvSpPr>
+          <p:cNvPr id="4" name="Datumsplatzhalter 3">
+            <a:extLst>
+              <a:ext uri="{FF2B5EF4-FFF2-40B4-BE49-F238E27FC236}">
+                <a16:creationId xmlns:a16="http://schemas.microsoft.com/office/drawing/2014/main" id="{81BDEA8C-CEED-0831-900B-B35E2D29C3D7}"/>
+              </a:ext>
+            </a:extLst>
+          </p:cNvPr>
+          <p:cNvSpPr>
+            <a:spLocks noGrp="1"/>
+          </p:cNvSpPr>
+          <p:nvPr>
+            <p:ph type="dt" sz="half" idx="10"/>
+          </p:nvPr>
+        </p:nvSpPr>
+        <p:spPr/>
+        <p:txBody>
+          <a:bodyPr/>
+          <a:lstStyle/>
+          <a:p>
+            <a:fld id="{810B8866-FDA1-CF4B-81CC-77ABF5682171}" type="datetime1">
+              <a:rPr lang="de-DE" smtClean="0"/>
+              <a:t>06.11.23</a:t>
+            </a:fld>
+            <a:endParaRPr lang="de-DE"/>
+          </a:p>
+        </p:txBody>
+      </p:sp>
+      <p:sp>
+        <p:nvSpPr>
+          <p:cNvPr id="5" name="Fußzeilenplatzhalter 4">
+            <a:extLst>
+              <a:ext uri="{FF2B5EF4-FFF2-40B4-BE49-F238E27FC236}">
+                <a16:creationId xmlns:a16="http://schemas.microsoft.com/office/drawing/2014/main" id="{877D226B-6FEA-24BB-13F2-958CBAD004FA}"/>
+              </a:ext>
+            </a:extLst>
+          </p:cNvPr>
+          <p:cNvSpPr>
+            <a:spLocks noGrp="1"/>
+          </p:cNvSpPr>
+          <p:nvPr>
+            <p:ph type="ftr" sz="quarter" idx="11"/>
+          </p:nvPr>
+        </p:nvSpPr>
+        <p:spPr/>
+        <p:txBody>
+          <a:bodyPr/>
+          <a:lstStyle/>
+          <a:p>
+            <a:r>
+              <a:rPr lang="de-DE"/>
+              <a:t>Sonnengold Solutions GmbH © 2023</a:t>
+            </a:r>
+          </a:p>
+        </p:txBody>
+      </p:sp>
+      <p:sp>
+        <p:nvSpPr>
+          <p:cNvPr id="6" name="Foliennummernplatzhalter 5">
+            <a:extLst>
+              <a:ext uri="{FF2B5EF4-FFF2-40B4-BE49-F238E27FC236}">
+                <a16:creationId xmlns:a16="http://schemas.microsoft.com/office/drawing/2014/main" id="{CD627F38-D88F-2C54-4E75-98C4B92D9CEC}"/>
+              </a:ext>
+            </a:extLst>
+          </p:cNvPr>
+          <p:cNvSpPr>
+            <a:spLocks noGrp="1"/>
+          </p:cNvSpPr>
+          <p:nvPr>
+            <p:ph type="sldNum" sz="quarter" idx="12"/>
+          </p:nvPr>
+        </p:nvSpPr>
+        <p:spPr/>
+        <p:txBody>
+          <a:bodyPr/>
+          <a:lstStyle/>
+          <a:p>
+            <a:fld id="{3D3C939C-4408-B746-BB33-D84893A8474B}" type="slidenum">
+              <a:rPr lang="de-DE" smtClean="0"/>
+              <a:t>18</a:t>
+            </a:fld>
+            <a:endParaRPr lang="de-DE"/>
+          </a:p>
+        </p:txBody>
+      </p:sp>
+      <p:sp>
+        <p:nvSpPr>
+          <p:cNvPr id="3" name="Inhaltsplatzhalter 2">
+            <a:extLst>
+              <a:ext uri="{FF2B5EF4-FFF2-40B4-BE49-F238E27FC236}">
+                <a16:creationId xmlns:a16="http://schemas.microsoft.com/office/drawing/2014/main" id="{3ED717B3-3FAA-BFFC-C8A3-1D5347569237}"/>
+              </a:ext>
+            </a:extLst>
+          </p:cNvPr>
+          <p:cNvSpPr>
+            <a:spLocks noGrp="1"/>
+          </p:cNvSpPr>
+          <p:nvPr>
+            <p:ph idx="1"/>
+          </p:nvPr>
+        </p:nvSpPr>
+        <p:spPr/>
+        <p:txBody>
+          <a:bodyPr>
+            <a:normAutofit/>
+          </a:bodyPr>
+          <a:lstStyle/>
+          <a:p>
+            <a:pPr marL="0" indent="0">
+              <a:buNone/>
+            </a:pPr>
+            <a:r>
+              <a:rPr lang="de-DE" sz="2200" b="1" dirty="0"/>
+              <a:t>Wichtige Kundendaten:</a:t>
+            </a:r>
+          </a:p>
+          <a:p>
+            <a:r>
+              <a:rPr lang="de-DE" sz="2000" u="sng" dirty="0"/>
+              <a:t>Kontaktdaten</a:t>
+            </a:r>
+            <a:r>
+              <a:rPr lang="de-DE" sz="2000" dirty="0"/>
+              <a:t>: Name, Adresse, Telefonnummer, E-Mail, Standort</a:t>
+            </a:r>
+          </a:p>
+          <a:p>
+            <a:r>
+              <a:rPr lang="de-DE" sz="2000" u="sng" dirty="0"/>
+              <a:t>Kaufhistorie</a:t>
+            </a:r>
+            <a:r>
+              <a:rPr lang="de-DE" sz="2000" dirty="0"/>
+              <a:t>: Bisherige Implementierungen</a:t>
+            </a:r>
+          </a:p>
+          <a:p>
+            <a:r>
+              <a:rPr lang="de-DE" sz="2000" u="sng" dirty="0"/>
+              <a:t>Bedarfsanalyse</a:t>
+            </a:r>
+            <a:r>
+              <a:rPr lang="de-DE" sz="2000" dirty="0"/>
+              <a:t>: Informationen zu spezifischen Anforderungen basierend auf Standort, Fläche, bisherigen Entwicklungen, Produktkategorie des Kunden (Energiebedarf) &amp; Arbeitszeiten</a:t>
+            </a:r>
+          </a:p>
+          <a:p>
+            <a:r>
+              <a:rPr lang="de-DE" sz="2000" u="sng" dirty="0"/>
+              <a:t>Kommunikationsverlauf</a:t>
+            </a:r>
+            <a:r>
+              <a:rPr lang="de-DE" sz="2000" dirty="0"/>
+              <a:t>: Protokolle von Gesprächen und E-Mails</a:t>
+            </a:r>
+          </a:p>
+          <a:p>
+            <a:pPr marL="0" indent="0">
+              <a:buNone/>
+            </a:pPr>
+            <a:r>
+              <a:rPr lang="de-DE" sz="2200" b="1" dirty="0"/>
+              <a:t>Kommunikationskanäle:</a:t>
+            </a:r>
+          </a:p>
+          <a:p>
+            <a:pPr marL="457200" indent="-457200">
+              <a:buFont typeface="+mj-lt"/>
+              <a:buAutoNum type="arabicPeriod"/>
+            </a:pPr>
+            <a:r>
+              <a:rPr lang="de-DE" sz="2200" dirty="0"/>
+              <a:t>☎️ Telefon</a:t>
+            </a:r>
+          </a:p>
+          <a:p>
+            <a:pPr marL="457200" indent="-457200">
+              <a:buFont typeface="+mj-lt"/>
+              <a:buAutoNum type="arabicPeriod"/>
+            </a:pPr>
+            <a:r>
+              <a:rPr lang="de-DE" sz="2200" dirty="0"/>
+              <a:t>📧 E-Mail</a:t>
+            </a:r>
+          </a:p>
+          <a:p>
+            <a:pPr marL="457200" indent="-457200">
+              <a:buFont typeface="+mj-lt"/>
+              <a:buAutoNum type="arabicPeriod"/>
+            </a:pPr>
+            <a:r>
+              <a:rPr lang="de-DE" sz="2200" dirty="0"/>
+              <a:t>🛜 Internet (</a:t>
+            </a:r>
+            <a:r>
+              <a:rPr lang="de-DE" sz="2200" dirty="0" err="1"/>
+              <a:t>Social</a:t>
+            </a:r>
+            <a:r>
+              <a:rPr lang="de-DE" sz="2200" dirty="0"/>
+              <a:t> Media, Webseite)</a:t>
+            </a:r>
+          </a:p>
+        </p:txBody>
+      </p:sp>
+    </p:spTree>
+    <p:extLst>
+      <p:ext uri="{BB962C8B-B14F-4D97-AF65-F5344CB8AC3E}">
+        <p14:creationId xmlns:p14="http://schemas.microsoft.com/office/powerpoint/2010/main" val="1741602038"/>
+      </p:ext>
+    </p:extLst>
+  </p:cSld>
+  <p:clrMapOvr>
+    <a:masterClrMapping/>
+  </p:clrMapOvr>
+</p:sld>
+</file>
+
+<file path=ppt/slides/slide19.xml><?xml version="1.0" encoding="utf-8"?>
+<p:sld xmlns:a="http://schemas.openxmlformats.org/drawingml/2006/main" xmlns:r="http://schemas.openxmlformats.org/officeDocument/2006/relationships" xmlns:p="http://schemas.openxmlformats.org/presentationml/2006/main">
+  <p:cSld>
+    <p:spTree>
+      <p:nvGrpSpPr>
+        <p:cNvPr id="1" name=""/>
+        <p:cNvGrpSpPr/>
+        <p:nvPr/>
+      </p:nvGrpSpPr>
+      <p:grpSpPr>
+        <a:xfrm>
+          <a:off x="0" y="0"/>
+          <a:ext cx="0" cy="0"/>
+          <a:chOff x="0" y="0"/>
+          <a:chExt cx="0" cy="0"/>
+        </a:xfrm>
+      </p:grpSpPr>
+      <p:sp>
+        <p:nvSpPr>
+          <p:cNvPr id="2" name="Titel 1">
+            <a:extLst>
+              <a:ext uri="{FF2B5EF4-FFF2-40B4-BE49-F238E27FC236}">
+                <a16:creationId xmlns:a16="http://schemas.microsoft.com/office/drawing/2014/main" id="{94EFAEC8-66BC-809C-4186-8F18EFA15EC8}"/>
+              </a:ext>
+            </a:extLst>
+          </p:cNvPr>
+          <p:cNvSpPr>
+            <a:spLocks noGrp="1"/>
+          </p:cNvSpPr>
+          <p:nvPr>
+            <p:ph type="title"/>
+          </p:nvPr>
+        </p:nvSpPr>
+        <p:spPr/>
+        <p:txBody>
+          <a:bodyPr>
+            <a:normAutofit fontScale="90000"/>
+          </a:bodyPr>
+          <a:lstStyle/>
+          <a:p>
+            <a:r>
+              <a:rPr lang="de-DE" dirty="0"/>
+              <a:t>CRM</a:t>
+            </a:r>
+          </a:p>
+        </p:txBody>
+      </p:sp>
+      <p:sp>
+        <p:nvSpPr>
+          <p:cNvPr id="4" name="Datumsplatzhalter 3">
+            <a:extLst>
+              <a:ext uri="{FF2B5EF4-FFF2-40B4-BE49-F238E27FC236}">
+                <a16:creationId xmlns:a16="http://schemas.microsoft.com/office/drawing/2014/main" id="{81BDEA8C-CEED-0831-900B-B35E2D29C3D7}"/>
+              </a:ext>
+            </a:extLst>
+          </p:cNvPr>
+          <p:cNvSpPr>
+            <a:spLocks noGrp="1"/>
+          </p:cNvSpPr>
+          <p:nvPr>
+            <p:ph type="dt" sz="half" idx="10"/>
+          </p:nvPr>
+        </p:nvSpPr>
+        <p:spPr/>
+        <p:txBody>
+          <a:bodyPr/>
+          <a:lstStyle/>
+          <a:p>
+            <a:fld id="{810B8866-FDA1-CF4B-81CC-77ABF5682171}" type="datetime1">
+              <a:rPr lang="de-DE" smtClean="0"/>
+              <a:t>06.11.23</a:t>
+            </a:fld>
+            <a:endParaRPr lang="de-DE"/>
+          </a:p>
+        </p:txBody>
+      </p:sp>
+      <p:sp>
+        <p:nvSpPr>
+          <p:cNvPr id="5" name="Fußzeilenplatzhalter 4">
+            <a:extLst>
+              <a:ext uri="{FF2B5EF4-FFF2-40B4-BE49-F238E27FC236}">
+                <a16:creationId xmlns:a16="http://schemas.microsoft.com/office/drawing/2014/main" id="{877D226B-6FEA-24BB-13F2-958CBAD004FA}"/>
+              </a:ext>
+            </a:extLst>
+          </p:cNvPr>
+          <p:cNvSpPr>
+            <a:spLocks noGrp="1"/>
+          </p:cNvSpPr>
+          <p:nvPr>
+            <p:ph type="ftr" sz="quarter" idx="11"/>
+          </p:nvPr>
+        </p:nvSpPr>
+        <p:spPr/>
+        <p:txBody>
+          <a:bodyPr/>
+          <a:lstStyle/>
+          <a:p>
+            <a:r>
+              <a:rPr lang="de-DE"/>
+              <a:t>Sonnengold Solutions GmbH © 2023</a:t>
+            </a:r>
+          </a:p>
+        </p:txBody>
+      </p:sp>
+      <p:sp>
+        <p:nvSpPr>
+          <p:cNvPr id="6" name="Foliennummernplatzhalter 5">
+            <a:extLst>
+              <a:ext uri="{FF2B5EF4-FFF2-40B4-BE49-F238E27FC236}">
+                <a16:creationId xmlns:a16="http://schemas.microsoft.com/office/drawing/2014/main" id="{CD627F38-D88F-2C54-4E75-98C4B92D9CEC}"/>
+              </a:ext>
+            </a:extLst>
+          </p:cNvPr>
+          <p:cNvSpPr>
+            <a:spLocks noGrp="1"/>
+          </p:cNvSpPr>
+          <p:nvPr>
+            <p:ph type="sldNum" sz="quarter" idx="12"/>
+          </p:nvPr>
+        </p:nvSpPr>
+        <p:spPr/>
+        <p:txBody>
+          <a:bodyPr/>
+          <a:lstStyle/>
+          <a:p>
+            <a:fld id="{3D3C939C-4408-B746-BB33-D84893A8474B}" type="slidenum">
+              <a:rPr lang="de-DE" smtClean="0"/>
+              <a:t>19</a:t>
+            </a:fld>
+            <a:endParaRPr lang="de-DE"/>
+          </a:p>
+        </p:txBody>
+      </p:sp>
+      <p:sp>
+        <p:nvSpPr>
+          <p:cNvPr id="3" name="Inhaltsplatzhalter 2">
+            <a:extLst>
+              <a:ext uri="{FF2B5EF4-FFF2-40B4-BE49-F238E27FC236}">
+                <a16:creationId xmlns:a16="http://schemas.microsoft.com/office/drawing/2014/main" id="{3ED717B3-3FAA-BFFC-C8A3-1D5347569237}"/>
+              </a:ext>
+            </a:extLst>
+          </p:cNvPr>
+          <p:cNvSpPr>
+            <a:spLocks noGrp="1"/>
+          </p:cNvSpPr>
+          <p:nvPr>
+            <p:ph idx="1"/>
+          </p:nvPr>
+        </p:nvSpPr>
+        <p:spPr/>
+        <p:txBody>
+          <a:bodyPr>
+            <a:normAutofit/>
+          </a:bodyPr>
+          <a:lstStyle/>
+          <a:p>
+            <a:pPr marL="0" indent="0">
+              <a:buNone/>
+            </a:pPr>
+            <a:r>
+              <a:rPr lang="de-DE" sz="2200" b="1" dirty="0"/>
+              <a:t>Kundenklassifizierung:</a:t>
+            </a:r>
+          </a:p>
+          <a:p>
+            <a:r>
+              <a:rPr lang="de-DE" sz="2000" u="sng" dirty="0"/>
+              <a:t>A-Kunden</a:t>
+            </a:r>
+            <a:r>
+              <a:rPr lang="de-DE" sz="2000" dirty="0"/>
+              <a:t>: Großkunden und Behörden</a:t>
+            </a:r>
+          </a:p>
+          <a:p>
+            <a:r>
+              <a:rPr lang="de-DE" sz="2000" u="sng" dirty="0"/>
+              <a:t>B-Kunden</a:t>
+            </a:r>
+            <a:r>
+              <a:rPr lang="de-DE" sz="2000" dirty="0"/>
+              <a:t>: Mittelständige Unternehmen</a:t>
+            </a:r>
+          </a:p>
+          <a:p>
+            <a:r>
+              <a:rPr lang="de-DE" sz="2000" u="sng" dirty="0">
+                <a:solidFill>
+                  <a:schemeClr val="tx1">
+                    <a:lumMod val="50000"/>
+                    <a:lumOff val="50000"/>
+                  </a:schemeClr>
+                </a:solidFill>
+              </a:rPr>
+              <a:t>C-Kunden</a:t>
+            </a:r>
+            <a:r>
+              <a:rPr lang="de-DE" sz="2000" dirty="0">
+                <a:solidFill>
+                  <a:schemeClr val="tx1">
+                    <a:lumMod val="50000"/>
+                    <a:lumOff val="50000"/>
+                  </a:schemeClr>
+                </a:solidFill>
+              </a:rPr>
+              <a:t>: Kleinkunden im Privatkundensegment</a:t>
+            </a:r>
+          </a:p>
+          <a:p>
+            <a:pPr marL="0" indent="0">
+              <a:buNone/>
+            </a:pPr>
+            <a:endParaRPr lang="de-DE" sz="2200" dirty="0"/>
+          </a:p>
+        </p:txBody>
+      </p:sp>
+    </p:spTree>
+    <p:extLst>
+      <p:ext uri="{BB962C8B-B14F-4D97-AF65-F5344CB8AC3E}">
+        <p14:creationId xmlns:p14="http://schemas.microsoft.com/office/powerpoint/2010/main" val="575291190"/>
       </p:ext>
     </p:extLst>
   </p:cSld>
@@ -11528,7 +13567,7 @@
           <a:p>
             <a:fld id="{EB4114AF-AE0B-1B4F-A693-516415E9CE10}" type="datetime1">
               <a:rPr lang="de-DE" smtClean="0"/>
-              <a:t>30.10.23</a:t>
+              <a:t>06.11.23</a:t>
             </a:fld>
             <a:endParaRPr lang="de-DE"/>
           </a:p>
@@ -11595,6 +13634,368 @@
     <p:extLst>
       <p:ext uri="{BB962C8B-B14F-4D97-AF65-F5344CB8AC3E}">
         <p14:creationId xmlns:p14="http://schemas.microsoft.com/office/powerpoint/2010/main" val="4270872073"/>
+      </p:ext>
+    </p:extLst>
+  </p:cSld>
+  <p:clrMapOvr>
+    <a:masterClrMapping/>
+  </p:clrMapOvr>
+</p:sld>
+</file>
+
+<file path=ppt/slides/slide20.xml><?xml version="1.0" encoding="utf-8"?>
+<p:sld xmlns:a="http://schemas.openxmlformats.org/drawingml/2006/main" xmlns:r="http://schemas.openxmlformats.org/officeDocument/2006/relationships" xmlns:p="http://schemas.openxmlformats.org/presentationml/2006/main">
+  <p:cSld>
+    <p:spTree>
+      <p:nvGrpSpPr>
+        <p:cNvPr id="1" name=""/>
+        <p:cNvGrpSpPr/>
+        <p:nvPr/>
+      </p:nvGrpSpPr>
+      <p:grpSpPr>
+        <a:xfrm>
+          <a:off x="0" y="0"/>
+          <a:ext cx="0" cy="0"/>
+          <a:chOff x="0" y="0"/>
+          <a:chExt cx="0" cy="0"/>
+        </a:xfrm>
+      </p:grpSpPr>
+      <p:sp>
+        <p:nvSpPr>
+          <p:cNvPr id="2" name="Titel 1">
+            <a:extLst>
+              <a:ext uri="{FF2B5EF4-FFF2-40B4-BE49-F238E27FC236}">
+                <a16:creationId xmlns:a16="http://schemas.microsoft.com/office/drawing/2014/main" id="{94EFAEC8-66BC-809C-4186-8F18EFA15EC8}"/>
+              </a:ext>
+            </a:extLst>
+          </p:cNvPr>
+          <p:cNvSpPr>
+            <a:spLocks noGrp="1"/>
+          </p:cNvSpPr>
+          <p:nvPr>
+            <p:ph type="title"/>
+          </p:nvPr>
+        </p:nvSpPr>
+        <p:spPr/>
+        <p:txBody>
+          <a:bodyPr>
+            <a:normAutofit fontScale="90000"/>
+          </a:bodyPr>
+          <a:lstStyle/>
+          <a:p>
+            <a:r>
+              <a:rPr lang="de-DE" dirty="0"/>
+              <a:t>CRM</a:t>
+            </a:r>
+          </a:p>
+        </p:txBody>
+      </p:sp>
+      <p:sp>
+        <p:nvSpPr>
+          <p:cNvPr id="4" name="Datumsplatzhalter 3">
+            <a:extLst>
+              <a:ext uri="{FF2B5EF4-FFF2-40B4-BE49-F238E27FC236}">
+                <a16:creationId xmlns:a16="http://schemas.microsoft.com/office/drawing/2014/main" id="{81BDEA8C-CEED-0831-900B-B35E2D29C3D7}"/>
+              </a:ext>
+            </a:extLst>
+          </p:cNvPr>
+          <p:cNvSpPr>
+            <a:spLocks noGrp="1"/>
+          </p:cNvSpPr>
+          <p:nvPr>
+            <p:ph type="dt" sz="half" idx="10"/>
+          </p:nvPr>
+        </p:nvSpPr>
+        <p:spPr/>
+        <p:txBody>
+          <a:bodyPr/>
+          <a:lstStyle/>
+          <a:p>
+            <a:fld id="{810B8866-FDA1-CF4B-81CC-77ABF5682171}" type="datetime1">
+              <a:rPr lang="de-DE" smtClean="0"/>
+              <a:t>06.11.23</a:t>
+            </a:fld>
+            <a:endParaRPr lang="de-DE"/>
+          </a:p>
+        </p:txBody>
+      </p:sp>
+      <p:sp>
+        <p:nvSpPr>
+          <p:cNvPr id="5" name="Fußzeilenplatzhalter 4">
+            <a:extLst>
+              <a:ext uri="{FF2B5EF4-FFF2-40B4-BE49-F238E27FC236}">
+                <a16:creationId xmlns:a16="http://schemas.microsoft.com/office/drawing/2014/main" id="{877D226B-6FEA-24BB-13F2-958CBAD004FA}"/>
+              </a:ext>
+            </a:extLst>
+          </p:cNvPr>
+          <p:cNvSpPr>
+            <a:spLocks noGrp="1"/>
+          </p:cNvSpPr>
+          <p:nvPr>
+            <p:ph type="ftr" sz="quarter" idx="11"/>
+          </p:nvPr>
+        </p:nvSpPr>
+        <p:spPr/>
+        <p:txBody>
+          <a:bodyPr/>
+          <a:lstStyle/>
+          <a:p>
+            <a:r>
+              <a:rPr lang="de-DE"/>
+              <a:t>Sonnengold Solutions GmbH © 2023</a:t>
+            </a:r>
+          </a:p>
+        </p:txBody>
+      </p:sp>
+      <p:sp>
+        <p:nvSpPr>
+          <p:cNvPr id="6" name="Foliennummernplatzhalter 5">
+            <a:extLst>
+              <a:ext uri="{FF2B5EF4-FFF2-40B4-BE49-F238E27FC236}">
+                <a16:creationId xmlns:a16="http://schemas.microsoft.com/office/drawing/2014/main" id="{CD627F38-D88F-2C54-4E75-98C4B92D9CEC}"/>
+              </a:ext>
+            </a:extLst>
+          </p:cNvPr>
+          <p:cNvSpPr>
+            <a:spLocks noGrp="1"/>
+          </p:cNvSpPr>
+          <p:nvPr>
+            <p:ph type="sldNum" sz="quarter" idx="12"/>
+          </p:nvPr>
+        </p:nvSpPr>
+        <p:spPr/>
+        <p:txBody>
+          <a:bodyPr/>
+          <a:lstStyle/>
+          <a:p>
+            <a:fld id="{3D3C939C-4408-B746-BB33-D84893A8474B}" type="slidenum">
+              <a:rPr lang="de-DE" smtClean="0"/>
+              <a:t>20</a:t>
+            </a:fld>
+            <a:endParaRPr lang="de-DE"/>
+          </a:p>
+        </p:txBody>
+      </p:sp>
+      <p:sp>
+        <p:nvSpPr>
+          <p:cNvPr id="3" name="Inhaltsplatzhalter 2">
+            <a:extLst>
+              <a:ext uri="{FF2B5EF4-FFF2-40B4-BE49-F238E27FC236}">
+                <a16:creationId xmlns:a16="http://schemas.microsoft.com/office/drawing/2014/main" id="{3ED717B3-3FAA-BFFC-C8A3-1D5347569237}"/>
+              </a:ext>
+            </a:extLst>
+          </p:cNvPr>
+          <p:cNvSpPr>
+            <a:spLocks noGrp="1"/>
+          </p:cNvSpPr>
+          <p:nvPr>
+            <p:ph idx="1"/>
+          </p:nvPr>
+        </p:nvSpPr>
+        <p:spPr/>
+        <p:txBody>
+          <a:bodyPr>
+            <a:normAutofit/>
+          </a:bodyPr>
+          <a:lstStyle/>
+          <a:p>
+            <a:pPr marL="0" indent="0">
+              <a:buNone/>
+            </a:pPr>
+            <a:r>
+              <a:rPr lang="de-DE" sz="2200" b="1" dirty="0"/>
+              <a:t>Maßnahmen zur Kundenbindung und -entwicklung:</a:t>
+            </a:r>
+          </a:p>
+          <a:p>
+            <a:r>
+              <a:rPr lang="de-DE" sz="2000" dirty="0"/>
+              <a:t>A-Kundenbetreuung: Regelmäßige Besuche, maßgeschneiderte Angebote, exklusive Dienstleistungen</a:t>
+            </a:r>
+          </a:p>
+          <a:p>
+            <a:r>
+              <a:rPr lang="de-DE" sz="2000" dirty="0"/>
+              <a:t>B-Kundenpflege: Angebotsaktualisierungen, Cross-Selling und Upselling</a:t>
+            </a:r>
+          </a:p>
+          <a:p>
+            <a:r>
+              <a:rPr lang="de-DE" sz="2000" dirty="0">
+                <a:solidFill>
+                  <a:schemeClr val="tx1">
+                    <a:lumMod val="50000"/>
+                    <a:lumOff val="50000"/>
+                  </a:schemeClr>
+                </a:solidFill>
+              </a:rPr>
+              <a:t>C-Kundenentwicklung: Marketingaktionen zur Steigerung des Interesses und der Loyalität</a:t>
+            </a:r>
+            <a:endParaRPr lang="de-DE" sz="2200" dirty="0">
+              <a:solidFill>
+                <a:schemeClr val="tx1">
+                  <a:lumMod val="50000"/>
+                  <a:lumOff val="50000"/>
+                </a:schemeClr>
+              </a:solidFill>
+            </a:endParaRPr>
+          </a:p>
+          <a:p>
+            <a:pPr marL="0" indent="0">
+              <a:buNone/>
+            </a:pPr>
+            <a:r>
+              <a:rPr lang="de-DE" sz="2200" b="1" dirty="0"/>
+              <a:t>Interne Unterstützung für CRM:</a:t>
+            </a:r>
+          </a:p>
+          <a:p>
+            <a:r>
+              <a:rPr lang="de-DE" sz="2000" dirty="0"/>
+              <a:t>Schulungen für das Vertriebsteam zur effektiven Nutzung des CRM-Systems</a:t>
+            </a:r>
+          </a:p>
+          <a:p>
+            <a:r>
+              <a:rPr lang="de-DE" sz="2000" dirty="0"/>
+              <a:t>Datensicherheit und Datenschutzrichtlinien für den Schutz sensibler Kundendaten</a:t>
+            </a:r>
+          </a:p>
+          <a:p>
+            <a:r>
+              <a:rPr lang="de-DE" sz="2000" dirty="0"/>
+              <a:t>Regelmäßige Überprüfung und Aktualisierung von Kundendaten, um deren Aktualität sicherzustellen</a:t>
+            </a:r>
+          </a:p>
+          <a:p>
+            <a:pPr marL="0" indent="0">
+              <a:buNone/>
+            </a:pPr>
+            <a:endParaRPr lang="de-DE" sz="2200" dirty="0"/>
+          </a:p>
+        </p:txBody>
+      </p:sp>
+    </p:spTree>
+    <p:extLst>
+      <p:ext uri="{BB962C8B-B14F-4D97-AF65-F5344CB8AC3E}">
+        <p14:creationId xmlns:p14="http://schemas.microsoft.com/office/powerpoint/2010/main" val="675485425"/>
+      </p:ext>
+    </p:extLst>
+  </p:cSld>
+  <p:clrMapOvr>
+    <a:masterClrMapping/>
+  </p:clrMapOvr>
+</p:sld>
+</file>
+
+<file path=ppt/slides/slide21.xml><?xml version="1.0" encoding="utf-8"?>
+<p:sld xmlns:a="http://schemas.openxmlformats.org/drawingml/2006/main" xmlns:r="http://schemas.openxmlformats.org/officeDocument/2006/relationships" xmlns:p="http://schemas.openxmlformats.org/presentationml/2006/main">
+  <p:cSld>
+    <p:spTree>
+      <p:nvGrpSpPr>
+        <p:cNvPr id="1" name=""/>
+        <p:cNvGrpSpPr/>
+        <p:nvPr/>
+      </p:nvGrpSpPr>
+      <p:grpSpPr>
+        <a:xfrm>
+          <a:off x="0" y="0"/>
+          <a:ext cx="0" cy="0"/>
+          <a:chOff x="0" y="0"/>
+          <a:chExt cx="0" cy="0"/>
+        </a:xfrm>
+      </p:grpSpPr>
+      <p:sp>
+        <p:nvSpPr>
+          <p:cNvPr id="2" name="Datumsplatzhalter 1">
+            <a:extLst>
+              <a:ext uri="{FF2B5EF4-FFF2-40B4-BE49-F238E27FC236}">
+                <a16:creationId xmlns:a16="http://schemas.microsoft.com/office/drawing/2014/main" id="{6DC77F81-C74E-7ADE-1D2A-E9DF0528675F}"/>
+              </a:ext>
+            </a:extLst>
+          </p:cNvPr>
+          <p:cNvSpPr>
+            <a:spLocks noGrp="1"/>
+          </p:cNvSpPr>
+          <p:nvPr>
+            <p:ph type="dt" sz="half" idx="10"/>
+          </p:nvPr>
+        </p:nvSpPr>
+        <p:spPr/>
+        <p:txBody>
+          <a:bodyPr/>
+          <a:lstStyle/>
+          <a:p>
+            <a:fld id="{833798E6-D6E8-0944-B30F-079EEF181697}" type="datetime1">
+              <a:rPr lang="de-DE" smtClean="0"/>
+              <a:t>06.11.23</a:t>
+            </a:fld>
+            <a:endParaRPr lang="de-DE"/>
+          </a:p>
+        </p:txBody>
+      </p:sp>
+      <p:sp>
+        <p:nvSpPr>
+          <p:cNvPr id="3" name="Fußzeilenplatzhalter 2">
+            <a:extLst>
+              <a:ext uri="{FF2B5EF4-FFF2-40B4-BE49-F238E27FC236}">
+                <a16:creationId xmlns:a16="http://schemas.microsoft.com/office/drawing/2014/main" id="{C9966194-5A1A-7E17-05EE-6F819BDBB60B}"/>
+              </a:ext>
+            </a:extLst>
+          </p:cNvPr>
+          <p:cNvSpPr>
+            <a:spLocks noGrp="1"/>
+          </p:cNvSpPr>
+          <p:nvPr>
+            <p:ph type="ftr" sz="quarter" idx="11"/>
+          </p:nvPr>
+        </p:nvSpPr>
+        <p:spPr/>
+        <p:txBody>
+          <a:bodyPr/>
+          <a:lstStyle/>
+          <a:p>
+            <a:r>
+              <a:rPr lang="de-DE"/>
+              <a:t>Sonnengold Solutions GmbH © 2023</a:t>
+            </a:r>
+          </a:p>
+        </p:txBody>
+      </p:sp>
+      <p:sp>
+        <p:nvSpPr>
+          <p:cNvPr id="4" name="Foliennummernplatzhalter 3">
+            <a:extLst>
+              <a:ext uri="{FF2B5EF4-FFF2-40B4-BE49-F238E27FC236}">
+                <a16:creationId xmlns:a16="http://schemas.microsoft.com/office/drawing/2014/main" id="{AA19E0C4-D630-F739-2A0E-B264FE53C398}"/>
+              </a:ext>
+            </a:extLst>
+          </p:cNvPr>
+          <p:cNvSpPr>
+            <a:spLocks noGrp="1"/>
+          </p:cNvSpPr>
+          <p:nvPr>
+            <p:ph type="sldNum" sz="quarter" idx="12"/>
+          </p:nvPr>
+        </p:nvSpPr>
+        <p:spPr/>
+        <p:txBody>
+          <a:bodyPr/>
+          <a:lstStyle/>
+          <a:p>
+            <a:fld id="{3D3C939C-4408-B746-BB33-D84893A8474B}" type="slidenum">
+              <a:rPr lang="de-DE" smtClean="0"/>
+              <a:pPr/>
+              <a:t>21</a:t>
+            </a:fld>
+            <a:endParaRPr lang="de-DE"/>
+          </a:p>
+        </p:txBody>
+      </p:sp>
+    </p:spTree>
+    <p:extLst>
+      <p:ext uri="{BB962C8B-B14F-4D97-AF65-F5344CB8AC3E}">
+        <p14:creationId xmlns:p14="http://schemas.microsoft.com/office/powerpoint/2010/main" val="1161656540"/>
       </p:ext>
     </p:extLst>
   </p:cSld>
@@ -11699,7 +14100,7 @@
           <a:p>
             <a:fld id="{DED8F35F-85E1-B449-BA7F-ED549C876216}" type="datetime1">
               <a:rPr lang="de-DE" smtClean="0"/>
-              <a:t>30.10.23</a:t>
+              <a:t>06.11.23</a:t>
             </a:fld>
             <a:endParaRPr lang="de-DE"/>
           </a:p>
@@ -11877,7 +14278,7 @@
           <a:p>
             <a:fld id="{810B8866-FDA1-CF4B-81CC-77ABF5682171}" type="datetime1">
               <a:rPr lang="de-DE" smtClean="0"/>
-              <a:t>30.10.23</a:t>
+              <a:t>06.11.23</a:t>
             </a:fld>
             <a:endParaRPr lang="de-DE"/>
           </a:p>
@@ -12582,7 +14983,7 @@
           <a:p>
             <a:fld id="{810B8866-FDA1-CF4B-81CC-77ABF5682171}" type="datetime1">
               <a:rPr lang="de-DE" smtClean="0"/>
-              <a:t>30.10.23</a:t>
+              <a:t>06.11.23</a:t>
             </a:fld>
             <a:endParaRPr lang="de-DE"/>
           </a:p>
@@ -13356,7 +15757,7 @@
               <a:buNone/>
             </a:pPr>
             <a:r>
-              <a:rPr lang="de-DE" b="1">
+              <a:rPr lang="de-DE" b="1" dirty="0">
                 <a:latin typeface="72 Brand"/>
               </a:rPr>
               <a:t>Erstes Jahr:</a:t>
@@ -13365,86 +15766,86 @@
           <a:p>
             <a:pPr lvl="1"/>
             <a:r>
-              <a:rPr lang="de-DE" sz="2800">
+              <a:rPr lang="de-DE" sz="2800" dirty="0">
                 <a:latin typeface="72 Brand"/>
               </a:rPr>
               <a:t>Kundengewinnung von 3 Großkunden</a:t>
             </a:r>
-            <a:endParaRPr lang="de-DE" sz="2800"/>
+            <a:endParaRPr lang="de-DE" sz="2800" dirty="0"/>
           </a:p>
           <a:p>
             <a:pPr lvl="1"/>
             <a:r>
-              <a:rPr lang="de-DE" sz="2800">
+              <a:rPr lang="de-DE" sz="2800" dirty="0">
                 <a:latin typeface="72 Brand"/>
               </a:rPr>
               <a:t>Erhöhung von Kundenzufriedenheit auf 90%</a:t>
             </a:r>
-            <a:endParaRPr lang="de-DE" sz="2800"/>
+            <a:endParaRPr lang="de-DE" sz="2800" dirty="0"/>
           </a:p>
           <a:p>
             <a:pPr lvl="1"/>
             <a:r>
-              <a:rPr lang="de-DE" sz="2800">
+              <a:rPr lang="de-DE" sz="2800" dirty="0">
                 <a:latin typeface="72 Brand"/>
               </a:rPr>
               <a:t>Erschließung von neuen Regionalen Märkten</a:t>
             </a:r>
-            <a:endParaRPr lang="de-DE" sz="2800"/>
+            <a:endParaRPr lang="de-DE" sz="2800" dirty="0"/>
           </a:p>
           <a:p>
             <a:pPr marL="0" indent="0">
               <a:buNone/>
             </a:pPr>
-            <a:endParaRPr lang="de-DE"/>
+            <a:endParaRPr lang="de-DE" dirty="0"/>
           </a:p>
           <a:p>
             <a:pPr marL="0" indent="0">
               <a:buNone/>
             </a:pPr>
             <a:r>
-              <a:rPr lang="de-DE" b="1">
+              <a:rPr lang="de-DE" b="1" dirty="0">
                 <a:latin typeface="72 Brand"/>
               </a:rPr>
               <a:t>Langfristige Ziele:</a:t>
             </a:r>
-            <a:endParaRPr lang="de-DE" b="1"/>
+            <a:endParaRPr lang="de-DE" b="1" dirty="0"/>
           </a:p>
           <a:p>
             <a:pPr lvl="1"/>
             <a:r>
-              <a:rPr lang="de-DE" sz="2800">
+              <a:rPr lang="de-DE" sz="2800" dirty="0">
                 <a:latin typeface="72 Brand"/>
               </a:rPr>
               <a:t>Marktführerschaft in unseren regionalen Märkten</a:t>
             </a:r>
-            <a:endParaRPr lang="de-DE" sz="2800"/>
+            <a:endParaRPr lang="de-DE" sz="2800" dirty="0"/>
           </a:p>
           <a:p>
             <a:pPr lvl="1"/>
             <a:r>
-              <a:rPr lang="de-DE" sz="2800">
+              <a:rPr lang="de-DE" sz="2800" dirty="0">
                 <a:latin typeface="72 Brand"/>
               </a:rPr>
               <a:t>Europaexpansion</a:t>
             </a:r>
-            <a:endParaRPr lang="de-DE" sz="2800"/>
+            <a:endParaRPr lang="de-DE" sz="2800" dirty="0"/>
           </a:p>
           <a:p>
             <a:pPr lvl="1"/>
             <a:r>
-              <a:rPr lang="de-DE" sz="2800">
+              <a:rPr lang="de-DE" sz="2800" dirty="0">
                 <a:latin typeface="72 Brand"/>
               </a:rPr>
               <a:t>Entwicklung innovativer Technologien und Patentschutz</a:t>
             </a:r>
-            <a:endParaRPr lang="de-DE" sz="2800"/>
+            <a:endParaRPr lang="de-DE" sz="2800" dirty="0"/>
           </a:p>
           <a:p>
             <a:pPr marL="0" indent="0">
               <a:buNone/>
             </a:pPr>
-            <a:endParaRPr lang="de-DE"/>
+            <a:endParaRPr lang="de-DE" dirty="0"/>
           </a:p>
         </p:txBody>
       </p:sp>
@@ -13471,7 +15872,7 @@
           <a:p>
             <a:fld id="{810B8866-FDA1-CF4B-81CC-77ABF5682171}" type="datetime1">
               <a:rPr lang="de-DE" smtClean="0"/>
-              <a:t>30.10.23</a:t>
+              <a:t>06.11.23</a:t>
             </a:fld>
             <a:endParaRPr lang="de-DE"/>
           </a:p>
@@ -13620,7 +16021,7 @@
           <a:p>
             <a:fld id="{810B8866-FDA1-CF4B-81CC-77ABF5682171}" type="datetime1">
               <a:rPr lang="de-DE" smtClean="0"/>
-              <a:t>30.10.23</a:t>
+              <a:t>06.11.23</a:t>
             </a:fld>
             <a:endParaRPr lang="de-DE"/>
           </a:p>
@@ -13710,19 +16111,19 @@
               <a:buNone/>
             </a:pPr>
             <a:r>
-              <a:rPr lang="de-DE" b="1">
+              <a:rPr lang="de-DE" b="1" dirty="0">
                 <a:latin typeface="72 Brand"/>
               </a:rPr>
               <a:t>Kundenzentrierung:</a:t>
             </a:r>
-            <a:endParaRPr lang="en-US">
+            <a:endParaRPr lang="en-US" dirty="0">
               <a:latin typeface="72 Brand"/>
             </a:endParaRPr>
           </a:p>
           <a:p>
             <a:pPr lvl="1"/>
             <a:r>
-              <a:rPr lang="de-DE">
+              <a:rPr lang="de-DE" dirty="0">
                 <a:latin typeface="Arial"/>
                 <a:cs typeface="Arial"/>
               </a:rPr>
@@ -13732,7 +16133,7 @@
           <a:p>
             <a:pPr lvl="1"/>
             <a:r>
-              <a:rPr lang="de-DE">
+              <a:rPr lang="de-DE" dirty="0">
                 <a:latin typeface="Arial"/>
                 <a:cs typeface="Arial"/>
               </a:rPr>
@@ -13744,13 +16145,13 @@
               <a:buNone/>
             </a:pPr>
             <a:r>
-              <a:rPr lang="de-DE" b="1">
+              <a:rPr lang="de-DE" b="1" dirty="0">
                 <a:latin typeface="72 Brand"/>
                 <a:cs typeface="Arial"/>
               </a:rPr>
               <a:t>Innovation:</a:t>
             </a:r>
-            <a:endParaRPr lang="en-US">
+            <a:endParaRPr lang="en-US" dirty="0">
               <a:latin typeface="72 Brand"/>
               <a:cs typeface="Arial"/>
             </a:endParaRPr>
@@ -13758,18 +16159,18 @@
           <a:p>
             <a:pPr lvl="1"/>
             <a:r>
-              <a:rPr lang="de-DE">
+              <a:rPr lang="de-DE" dirty="0">
                 <a:latin typeface="Arial"/>
                 <a:cs typeface="Arial"/>
               </a:rPr>
               <a:t>Forschung und Entwicklung für innovative Technologien</a:t>
             </a:r>
-            <a:endParaRPr lang="de-DE"/>
+            <a:endParaRPr lang="de-DE" dirty="0"/>
           </a:p>
           <a:p>
             <a:pPr lvl="1"/>
             <a:r>
-              <a:rPr lang="de-DE">
+              <a:rPr lang="de-DE" dirty="0">
                 <a:latin typeface="Arial"/>
                 <a:cs typeface="Arial"/>
               </a:rPr>
@@ -13781,13 +16182,13 @@
               <a:buNone/>
             </a:pPr>
             <a:r>
-              <a:rPr lang="de-DE" b="1">
+              <a:rPr lang="de-DE" b="1" dirty="0">
                 <a:latin typeface="72 Brand"/>
                 <a:cs typeface="Arial"/>
               </a:rPr>
               <a:t>Expansion:</a:t>
             </a:r>
-            <a:endParaRPr lang="en-US">
+            <a:endParaRPr lang="en-US" dirty="0">
               <a:latin typeface="72 Brand"/>
               <a:cs typeface="Arial"/>
             </a:endParaRPr>
@@ -13798,13 +16199,13 @@
               <a:buChar char="•"/>
             </a:pPr>
             <a:r>
-              <a:rPr lang="de-DE">
+              <a:rPr lang="de-DE" dirty="0">
                 <a:latin typeface="Arial"/>
                 <a:cs typeface="Arial"/>
               </a:rPr>
               <a:t>Präsenz in neuen Regionen ausbauen</a:t>
             </a:r>
-            <a:endParaRPr lang="de-DE"/>
+            <a:endParaRPr lang="de-DE" dirty="0"/>
           </a:p>
           <a:p>
             <a:pPr marL="971550" lvl="1" indent="-285750">
@@ -13812,7 +16213,7 @@
               <a:buChar char="•"/>
             </a:pPr>
             <a:r>
-              <a:rPr lang="de-DE">
+              <a:rPr lang="de-DE" dirty="0">
                 <a:latin typeface="Arial"/>
                 <a:cs typeface="Arial"/>
               </a:rPr>
@@ -13824,13 +16225,13 @@
               <a:buNone/>
             </a:pPr>
             <a:r>
-              <a:rPr lang="de-DE" b="1">
+              <a:rPr lang="de-DE" b="1" dirty="0">
                 <a:latin typeface="72 Brand"/>
                 <a:cs typeface="Arial"/>
               </a:rPr>
               <a:t>Nachhaltigkeit:</a:t>
             </a:r>
-            <a:endParaRPr lang="en-US">
+            <a:endParaRPr lang="en-US" dirty="0">
               <a:latin typeface="72 Brand"/>
               <a:cs typeface="Arial"/>
             </a:endParaRPr>
@@ -13841,25 +16242,25 @@
               <a:buChar char="•"/>
             </a:pPr>
             <a:r>
-              <a:rPr lang="de-DE">
+              <a:rPr lang="de-DE" dirty="0">
                 <a:latin typeface="Arial"/>
                 <a:cs typeface="Arial"/>
               </a:rPr>
               <a:t>umweltfreundliche Geschäftspraktiken</a:t>
             </a:r>
-            <a:endParaRPr lang="de-DE"/>
+            <a:endParaRPr lang="de-DE" dirty="0"/>
           </a:p>
           <a:p>
             <a:pPr marL="457200" lvl="1" indent="0">
               <a:buNone/>
             </a:pPr>
-            <a:endParaRPr lang="de-DE">
+            <a:endParaRPr lang="de-DE" dirty="0">
               <a:latin typeface="Arial"/>
               <a:cs typeface="Arial"/>
             </a:endParaRPr>
           </a:p>
           <a:p>
-            <a:endParaRPr lang="en-US">
+            <a:endParaRPr lang="en-US" dirty="0">
               <a:cs typeface="Arial"/>
             </a:endParaRPr>
           </a:p>
@@ -15014,7 +17415,7 @@
           <a:p>
             <a:fld id="{810B8866-FDA1-CF4B-81CC-77ABF5682171}" type="datetime1">
               <a:rPr lang="de-DE" smtClean="0"/>
-              <a:t>30.10.23</a:t>
+              <a:t>06.11.23</a:t>
             </a:fld>
             <a:endParaRPr lang="de-DE"/>
           </a:p>
@@ -15430,7 +17831,7 @@
           <a:p>
             <a:fld id="{810B8866-FDA1-CF4B-81CC-77ABF5682171}" type="datetime1">
               <a:rPr lang="de-DE" smtClean="0"/>
-              <a:t>30.10.23</a:t>
+              <a:t>06.11.23</a:t>
             </a:fld>
             <a:endParaRPr lang="de-DE"/>
           </a:p>

</xml_diff>